<commit_message>
No idea what this stuff is
</commit_message>
<xml_diff>
--- a/overlay.pptx
+++ b/overlay.pptx
@@ -5,7 +5,15 @@
     <p:sldMasterId id="2147483648" r:id="rId1"/>
   </p:sldMasterIdLst>
   <p:sldIdLst>
-    <p:sldId id="256" r:id="rId2"/>
+    <p:sldId id="258" r:id="rId2"/>
+    <p:sldId id="257" r:id="rId3"/>
+    <p:sldId id="262" r:id="rId4"/>
+    <p:sldId id="259" r:id="rId5"/>
+    <p:sldId id="260" r:id="rId6"/>
+    <p:sldId id="261" r:id="rId7"/>
+    <p:sldId id="264" r:id="rId8"/>
+    <p:sldId id="265" r:id="rId9"/>
+    <p:sldId id="263" r:id="rId10"/>
   </p:sldIdLst>
   <p:sldSz cx="12192000" cy="6858000"/>
   <p:notesSz cx="6858000" cy="9144000"/>
@@ -13,7 +21,7 @@
     <a:defPPr>
       <a:defRPr lang="en-US"/>
     </a:defPPr>
-    <a:lvl1pPr marL="0" algn="l" defTabSz="914400" rtl="0" eaLnBrk="1" latinLnBrk="0" hangingPunct="1">
+    <a:lvl1pPr marL="0" algn="l" defTabSz="914363" rtl="0" eaLnBrk="1" latinLnBrk="0" hangingPunct="1">
       <a:defRPr sz="1800" kern="1200">
         <a:solidFill>
           <a:schemeClr val="tx1"/>
@@ -23,7 +31,7 @@
         <a:cs typeface="+mn-cs"/>
       </a:defRPr>
     </a:lvl1pPr>
-    <a:lvl2pPr marL="457200" algn="l" defTabSz="914400" rtl="0" eaLnBrk="1" latinLnBrk="0" hangingPunct="1">
+    <a:lvl2pPr marL="457182" algn="l" defTabSz="914363" rtl="0" eaLnBrk="1" latinLnBrk="0" hangingPunct="1">
       <a:defRPr sz="1800" kern="1200">
         <a:solidFill>
           <a:schemeClr val="tx1"/>
@@ -33,7 +41,7 @@
         <a:cs typeface="+mn-cs"/>
       </a:defRPr>
     </a:lvl2pPr>
-    <a:lvl3pPr marL="914400" algn="l" defTabSz="914400" rtl="0" eaLnBrk="1" latinLnBrk="0" hangingPunct="1">
+    <a:lvl3pPr marL="914363" algn="l" defTabSz="914363" rtl="0" eaLnBrk="1" latinLnBrk="0" hangingPunct="1">
       <a:defRPr sz="1800" kern="1200">
         <a:solidFill>
           <a:schemeClr val="tx1"/>
@@ -43,7 +51,7 @@
         <a:cs typeface="+mn-cs"/>
       </a:defRPr>
     </a:lvl3pPr>
-    <a:lvl4pPr marL="1371600" algn="l" defTabSz="914400" rtl="0" eaLnBrk="1" latinLnBrk="0" hangingPunct="1">
+    <a:lvl4pPr marL="1371545" algn="l" defTabSz="914363" rtl="0" eaLnBrk="1" latinLnBrk="0" hangingPunct="1">
       <a:defRPr sz="1800" kern="1200">
         <a:solidFill>
           <a:schemeClr val="tx1"/>
@@ -53,7 +61,7 @@
         <a:cs typeface="+mn-cs"/>
       </a:defRPr>
     </a:lvl4pPr>
-    <a:lvl5pPr marL="1828800" algn="l" defTabSz="914400" rtl="0" eaLnBrk="1" latinLnBrk="0" hangingPunct="1">
+    <a:lvl5pPr marL="1828727" algn="l" defTabSz="914363" rtl="0" eaLnBrk="1" latinLnBrk="0" hangingPunct="1">
       <a:defRPr sz="1800" kern="1200">
         <a:solidFill>
           <a:schemeClr val="tx1"/>
@@ -63,7 +71,7 @@
         <a:cs typeface="+mn-cs"/>
       </a:defRPr>
     </a:lvl5pPr>
-    <a:lvl6pPr marL="2286000" algn="l" defTabSz="914400" rtl="0" eaLnBrk="1" latinLnBrk="0" hangingPunct="1">
+    <a:lvl6pPr marL="2285909" algn="l" defTabSz="914363" rtl="0" eaLnBrk="1" latinLnBrk="0" hangingPunct="1">
       <a:defRPr sz="1800" kern="1200">
         <a:solidFill>
           <a:schemeClr val="tx1"/>
@@ -73,7 +81,7 @@
         <a:cs typeface="+mn-cs"/>
       </a:defRPr>
     </a:lvl6pPr>
-    <a:lvl7pPr marL="2743200" algn="l" defTabSz="914400" rtl="0" eaLnBrk="1" latinLnBrk="0" hangingPunct="1">
+    <a:lvl7pPr marL="2743090" algn="l" defTabSz="914363" rtl="0" eaLnBrk="1" latinLnBrk="0" hangingPunct="1">
       <a:defRPr sz="1800" kern="1200">
         <a:solidFill>
           <a:schemeClr val="tx1"/>
@@ -83,7 +91,7 @@
         <a:cs typeface="+mn-cs"/>
       </a:defRPr>
     </a:lvl7pPr>
-    <a:lvl8pPr marL="3200400" algn="l" defTabSz="914400" rtl="0" eaLnBrk="1" latinLnBrk="0" hangingPunct="1">
+    <a:lvl8pPr marL="3200272" algn="l" defTabSz="914363" rtl="0" eaLnBrk="1" latinLnBrk="0" hangingPunct="1">
       <a:defRPr sz="1800" kern="1200">
         <a:solidFill>
           <a:schemeClr val="tx1"/>
@@ -93,7 +101,7 @@
         <a:cs typeface="+mn-cs"/>
       </a:defRPr>
     </a:lvl8pPr>
-    <a:lvl9pPr marL="3657600" algn="l" defTabSz="914400" rtl="0" eaLnBrk="1" latinLnBrk="0" hangingPunct="1">
+    <a:lvl9pPr marL="3657454" algn="l" defTabSz="914363" rtl="0" eaLnBrk="1" latinLnBrk="0" hangingPunct="1">
       <a:defRPr sz="1800" kern="1200">
         <a:solidFill>
           <a:schemeClr val="tx1"/>
@@ -259,7 +267,7 @@
           <a:p>
             <a:fld id="{1F4C6B18-0768-428F-A722-14F2AB9A0C3F}" type="datetimeFigureOut">
               <a:rPr lang="en-US" smtClean="0"/>
-              <a:t>4/7/2019</a:t>
+              <a:t>8/4/19</a:t>
             </a:fld>
             <a:endParaRPr lang="en-US"/>
           </a:p>
@@ -457,7 +465,7 @@
           <a:p>
             <a:fld id="{1F4C6B18-0768-428F-A722-14F2AB9A0C3F}" type="datetimeFigureOut">
               <a:rPr lang="en-US" smtClean="0"/>
-              <a:t>4/7/2019</a:t>
+              <a:t>8/4/19</a:t>
             </a:fld>
             <a:endParaRPr lang="en-US"/>
           </a:p>
@@ -565,7 +573,7 @@
         </p:nvSpPr>
         <p:spPr>
           <a:xfrm>
-            <a:off x="8724900" y="365125"/>
+            <a:off x="8724901" y="365125"/>
             <a:ext cx="2628900" cy="5811838"/>
           </a:xfrm>
         </p:spPr>
@@ -598,7 +606,7 @@
         </p:nvSpPr>
         <p:spPr>
           <a:xfrm>
-            <a:off x="838200" y="365125"/>
+            <a:off x="838201" y="365125"/>
             <a:ext cx="7734300" cy="5811838"/>
           </a:xfrm>
         </p:spPr>
@@ -665,7 +673,7 @@
           <a:p>
             <a:fld id="{1F4C6B18-0768-428F-A722-14F2AB9A0C3F}" type="datetimeFigureOut">
               <a:rPr lang="en-US" smtClean="0"/>
-              <a:t>4/7/2019</a:t>
+              <a:t>8/4/19</a:t>
             </a:fld>
             <a:endParaRPr lang="en-US"/>
           </a:p>
@@ -863,7 +871,7 @@
           <a:p>
             <a:fld id="{1F4C6B18-0768-428F-A722-14F2AB9A0C3F}" type="datetimeFigureOut">
               <a:rPr lang="en-US" smtClean="0"/>
-              <a:t>4/7/2019</a:t>
+              <a:t>8/4/19</a:t>
             </a:fld>
             <a:endParaRPr lang="en-US"/>
           </a:p>
@@ -971,7 +979,7 @@
         </p:nvSpPr>
         <p:spPr>
           <a:xfrm>
-            <a:off x="831850" y="1709738"/>
+            <a:off x="831851" y="1709739"/>
             <a:ext cx="10515600" cy="2852737"/>
           </a:xfrm>
         </p:spPr>
@@ -1008,7 +1016,7 @@
         </p:nvSpPr>
         <p:spPr>
           <a:xfrm>
-            <a:off x="831850" y="4589463"/>
+            <a:off x="831851" y="4589464"/>
             <a:ext cx="10515600" cy="1500187"/>
           </a:xfrm>
         </p:spPr>
@@ -1138,7 +1146,7 @@
           <a:p>
             <a:fld id="{1F4C6B18-0768-428F-A722-14F2AB9A0C3F}" type="datetimeFigureOut">
               <a:rPr lang="en-US" smtClean="0"/>
-              <a:t>4/7/2019</a:t>
+              <a:t>8/4/19</a:t>
             </a:fld>
             <a:endParaRPr lang="en-US"/>
           </a:p>
@@ -1403,7 +1411,7 @@
           <a:p>
             <a:fld id="{1F4C6B18-0768-428F-A722-14F2AB9A0C3F}" type="datetimeFigureOut">
               <a:rPr lang="en-US" smtClean="0"/>
-              <a:t>4/7/2019</a:t>
+              <a:t>8/4/19</a:t>
             </a:fld>
             <a:endParaRPr lang="en-US"/>
           </a:p>
@@ -1544,7 +1552,7 @@
         </p:nvSpPr>
         <p:spPr>
           <a:xfrm>
-            <a:off x="839788" y="1681163"/>
+            <a:off x="839789" y="1681163"/>
             <a:ext cx="5157787" cy="823912"/>
           </a:xfrm>
         </p:spPr>
@@ -1615,7 +1623,7 @@
         </p:nvSpPr>
         <p:spPr>
           <a:xfrm>
-            <a:off x="839788" y="2505075"/>
+            <a:off x="839789" y="2505076"/>
             <a:ext cx="5157787" cy="3684588"/>
           </a:xfrm>
         </p:spPr>
@@ -1677,7 +1685,7 @@
         </p:nvSpPr>
         <p:spPr>
           <a:xfrm>
-            <a:off x="6172200" y="1681163"/>
+            <a:off x="6172201" y="1681163"/>
             <a:ext cx="5183188" cy="823912"/>
           </a:xfrm>
         </p:spPr>
@@ -1748,7 +1756,7 @@
         </p:nvSpPr>
         <p:spPr>
           <a:xfrm>
-            <a:off x="6172200" y="2505075"/>
+            <a:off x="6172201" y="2505076"/>
             <a:ext cx="5183188" cy="3684588"/>
           </a:xfrm>
         </p:spPr>
@@ -1815,7 +1823,7 @@
           <a:p>
             <a:fld id="{1F4C6B18-0768-428F-A722-14F2AB9A0C3F}" type="datetimeFigureOut">
               <a:rPr lang="en-US" smtClean="0"/>
-              <a:t>4/7/2019</a:t>
+              <a:t>8/4/19</a:t>
             </a:fld>
             <a:endParaRPr lang="en-US"/>
           </a:p>
@@ -1956,7 +1964,7 @@
           <a:p>
             <a:fld id="{1F4C6B18-0768-428F-A722-14F2AB9A0C3F}" type="datetimeFigureOut">
               <a:rPr lang="en-US" smtClean="0"/>
-              <a:t>4/7/2019</a:t>
+              <a:t>8/4/19</a:t>
             </a:fld>
             <a:endParaRPr lang="en-US"/>
           </a:p>
@@ -2069,7 +2077,7 @@
           <a:p>
             <a:fld id="{1F4C6B18-0768-428F-A722-14F2AB9A0C3F}" type="datetimeFigureOut">
               <a:rPr lang="en-US" smtClean="0"/>
-              <a:t>4/7/2019</a:t>
+              <a:t>8/4/19</a:t>
             </a:fld>
             <a:endParaRPr lang="en-US"/>
           </a:p>
@@ -2214,7 +2222,7 @@
         </p:nvSpPr>
         <p:spPr>
           <a:xfrm>
-            <a:off x="5183188" y="987425"/>
+            <a:off x="5183188" y="987426"/>
             <a:ext cx="6172200" cy="4873625"/>
           </a:xfrm>
         </p:spPr>
@@ -2380,7 +2388,7 @@
           <a:p>
             <a:fld id="{1F4C6B18-0768-428F-A722-14F2AB9A0C3F}" type="datetimeFigureOut">
               <a:rPr lang="en-US" smtClean="0"/>
-              <a:t>4/7/2019</a:t>
+              <a:t>8/4/19</a:t>
             </a:fld>
             <a:endParaRPr lang="en-US"/>
           </a:p>
@@ -2525,7 +2533,7 @@
         </p:nvSpPr>
         <p:spPr>
           <a:xfrm>
-            <a:off x="5183188" y="987425"/>
+            <a:off x="5183188" y="987426"/>
             <a:ext cx="6172200" cy="4873625"/>
           </a:xfrm>
         </p:spPr>
@@ -2668,7 +2676,7 @@
           <a:p>
             <a:fld id="{1F4C6B18-0768-428F-A722-14F2AB9A0C3F}" type="datetimeFigureOut">
               <a:rPr lang="en-US" smtClean="0"/>
-              <a:t>4/7/2019</a:t>
+              <a:t>8/4/19</a:t>
             </a:fld>
             <a:endParaRPr lang="en-US"/>
           </a:p>
@@ -2745,9 +2753,12 @@
 <p:sldMaster xmlns:a="http://schemas.openxmlformats.org/drawingml/2006/main" xmlns:r="http://schemas.openxmlformats.org/officeDocument/2006/relationships" xmlns:p="http://schemas.openxmlformats.org/presentationml/2006/main">
   <p:cSld>
     <p:bg>
-      <p:bgRef idx="1001">
-        <a:schemeClr val="bg1"/>
-      </p:bgRef>
+      <p:bgPr>
+        <a:solidFill>
+          <a:srgbClr val="00FF00"/>
+        </a:solidFill>
+        <a:effectLst/>
+      </p:bgPr>
     </p:bg>
     <p:spTree>
       <p:nvGrpSpPr>
@@ -2886,7 +2897,7 @@
         </p:nvSpPr>
         <p:spPr>
           <a:xfrm>
-            <a:off x="838200" y="6356350"/>
+            <a:off x="838200" y="6356352"/>
             <a:ext cx="2743200" cy="365125"/>
           </a:xfrm>
           <a:prstGeom prst="rect">
@@ -2909,7 +2920,7 @@
           <a:p>
             <a:fld id="{1F4C6B18-0768-428F-A722-14F2AB9A0C3F}" type="datetimeFigureOut">
               <a:rPr lang="en-US" smtClean="0"/>
-              <a:t>4/7/2019</a:t>
+              <a:t>8/4/19</a:t>
             </a:fld>
             <a:endParaRPr lang="en-US"/>
           </a:p>
@@ -2933,7 +2944,7 @@
         </p:nvSpPr>
         <p:spPr>
           <a:xfrm>
-            <a:off x="4038600" y="6356350"/>
+            <a:off x="4038600" y="6356352"/>
             <a:ext cx="4114800" cy="365125"/>
           </a:xfrm>
           <a:prstGeom prst="rect">
@@ -2976,7 +2987,7 @@
         </p:nvSpPr>
         <p:spPr>
           <a:xfrm>
-            <a:off x="8610600" y="6356350"/>
+            <a:off x="8610600" y="6356352"/>
             <a:ext cx="2743200" cy="365125"/>
           </a:xfrm>
           <a:prstGeom prst="rect">
@@ -3312,14 +3323,6 @@
 <file path=ppt/slides/slide1.xml><?xml version="1.0" encoding="utf-8"?>
 <p:sld xmlns:a="http://schemas.openxmlformats.org/drawingml/2006/main" xmlns:r="http://schemas.openxmlformats.org/officeDocument/2006/relationships" xmlns:p="http://schemas.openxmlformats.org/presentationml/2006/main">
   <p:cSld>
-    <p:bg>
-      <p:bgPr>
-        <a:solidFill>
-          <a:srgbClr val="00FF00"/>
-        </a:solidFill>
-        <a:effectLst/>
-      </p:bgPr>
-    </p:bg>
     <p:spTree>
       <p:nvGrpSpPr>
         <p:cNvPr id="1" name=""/>
@@ -3334,42 +3337,527 @@
           <a:chExt cx="0" cy="0"/>
         </a:xfrm>
       </p:grpSpPr>
-      <p:sp>
-        <p:nvSpPr>
-          <p:cNvPr id="4" name="Rectangle 3">
-            <a:extLst>
-              <a:ext uri="{FF2B5EF4-FFF2-40B4-BE49-F238E27FC236}">
-                <a16:creationId xmlns:a16="http://schemas.microsoft.com/office/drawing/2014/main" id="{EEE063DD-EC15-4B4A-9487-01BF8525900C}"/>
-              </a:ext>
-            </a:extLst>
-          </p:cNvPr>
-          <p:cNvSpPr/>
+      <p:pic>
+        <p:nvPicPr>
+          <p:cNvPr id="10" name="Picture 9">
+            <a:extLst>
+              <a:ext uri="{FF2B5EF4-FFF2-40B4-BE49-F238E27FC236}">
+                <a16:creationId xmlns:a16="http://schemas.microsoft.com/office/drawing/2014/main" id="{3510D210-C82F-7A44-9AE2-2128C3EB58F2}"/>
+              </a:ext>
+            </a:extLst>
+          </p:cNvPr>
+          <p:cNvPicPr>
+            <a:picLocks noChangeAspect="1"/>
+          </p:cNvPicPr>
           <p:nvPr/>
-        </p:nvSpPr>
+        </p:nvPicPr>
+        <p:blipFill rotWithShape="1">
+          <a:blip r:embed="rId2">
+            <a:extLst>
+              <a:ext uri="{28A0092B-C50C-407E-A947-70E740481C1C}">
+                <a14:useLocalDpi xmlns:a14="http://schemas.microsoft.com/office/drawing/2010/main" val="0"/>
+              </a:ext>
+            </a:extLst>
+          </a:blip>
+          <a:srcRect t="16619"/>
+          <a:stretch/>
+        </p:blipFill>
         <p:spPr>
           <a:xfrm>
-            <a:off x="-1" y="4896089"/>
-            <a:ext cx="10116273" cy="1099930"/>
+            <a:off x="-74045" y="-101332"/>
+            <a:ext cx="12437041" cy="6999843"/>
           </a:xfrm>
           <a:prstGeom prst="rect">
             <a:avLst/>
           </a:prstGeom>
-          <a:solidFill>
-            <a:schemeClr val="tx1">
-              <a:lumMod val="75000"/>
-              <a:lumOff val="25000"/>
-            </a:schemeClr>
-          </a:solidFill>
+        </p:spPr>
+      </p:pic>
+      <p:sp>
+        <p:nvSpPr>
+          <p:cNvPr id="2" name="TextBox 1">
+            <a:extLst>
+              <a:ext uri="{FF2B5EF4-FFF2-40B4-BE49-F238E27FC236}">
+                <a16:creationId xmlns:a16="http://schemas.microsoft.com/office/drawing/2014/main" id="{CC7D800F-D3D2-FF4B-A3C6-3E55C357303B}"/>
+              </a:ext>
+            </a:extLst>
+          </p:cNvPr>
+          <p:cNvSpPr txBox="1"/>
+          <p:nvPr/>
+        </p:nvSpPr>
+        <p:spPr>
+          <a:xfrm>
+            <a:off x="3943241" y="401379"/>
+            <a:ext cx="4402468" cy="707886"/>
+          </a:xfrm>
+          <a:prstGeom prst="rect">
+            <a:avLst/>
+          </a:prstGeom>
+          <a:noFill/>
+        </p:spPr>
+        <p:txBody>
+          <a:bodyPr wrap="square" rtlCol="0" anchor="ctr">
+            <a:spAutoFit/>
+          </a:bodyPr>
+          <a:lstStyle/>
+          <a:p>
+            <a:pPr algn="ctr"/>
+            <a:r>
+              <a:rPr lang="en-US" sz="4000" dirty="0">
+                <a:solidFill>
+                  <a:schemeClr val="bg1">
+                    <a:lumMod val="95000"/>
+                  </a:schemeClr>
+                </a:solidFill>
+                <a:latin typeface="Pristina" panose="03060402040406080204" pitchFamily="66" charset="77"/>
+              </a:rPr>
+              <a:t>Zarahemla Branch</a:t>
+            </a:r>
+          </a:p>
+        </p:txBody>
+      </p:sp>
+      <p:grpSp>
+        <p:nvGrpSpPr>
+          <p:cNvPr id="16" name="Group 15">
+            <a:extLst>
+              <a:ext uri="{FF2B5EF4-FFF2-40B4-BE49-F238E27FC236}">
+                <a16:creationId xmlns:a16="http://schemas.microsoft.com/office/drawing/2014/main" id="{63D1E4BC-26FB-C64B-8ADB-9B44369F594C}"/>
+              </a:ext>
+            </a:extLst>
+          </p:cNvPr>
+          <p:cNvGrpSpPr/>
+          <p:nvPr/>
+        </p:nvGrpSpPr>
+        <p:grpSpPr>
+          <a:xfrm>
+            <a:off x="-522543" y="5767286"/>
+            <a:ext cx="13334036" cy="585761"/>
+            <a:chOff x="6980" y="6308841"/>
+            <a:chExt cx="12185020" cy="585761"/>
+          </a:xfrm>
+        </p:grpSpPr>
+        <p:sp>
+          <p:nvSpPr>
+            <p:cNvPr id="11" name="Rectangle 10">
+              <a:extLst>
+                <a:ext uri="{FF2B5EF4-FFF2-40B4-BE49-F238E27FC236}">
+                  <a16:creationId xmlns:a16="http://schemas.microsoft.com/office/drawing/2014/main" id="{5B5367FB-EAFD-4742-9F50-05904C1BB900}"/>
+                </a:ext>
+              </a:extLst>
+            </p:cNvPr>
+            <p:cNvSpPr/>
+            <p:nvPr/>
+          </p:nvSpPr>
+          <p:spPr>
+            <a:xfrm>
+              <a:off x="6980" y="6308841"/>
+              <a:ext cx="12185020" cy="552000"/>
+            </a:xfrm>
+            <a:prstGeom prst="rect">
+              <a:avLst/>
+            </a:prstGeom>
+            <a:gradFill flip="none" rotWithShape="1">
+              <a:gsLst>
+                <a:gs pos="0">
+                  <a:srgbClr val="BFB097">
+                    <a:alpha val="30000"/>
+                  </a:srgbClr>
+                </a:gs>
+                <a:gs pos="49000">
+                  <a:srgbClr val="BFB097">
+                    <a:alpha val="80000"/>
+                  </a:srgbClr>
+                </a:gs>
+                <a:gs pos="100000">
+                  <a:srgbClr val="BFB097">
+                    <a:alpha val="30000"/>
+                  </a:srgbClr>
+                </a:gs>
+              </a:gsLst>
+              <a:lin ang="0" scaled="1"/>
+              <a:tileRect/>
+            </a:gradFill>
+            <a:ln>
+              <a:noFill/>
+            </a:ln>
+          </p:spPr>
+          <p:style>
+            <a:lnRef idx="2">
+              <a:schemeClr val="accent1">
+                <a:shade val="50000"/>
+              </a:schemeClr>
+            </a:lnRef>
+            <a:fillRef idx="1">
+              <a:schemeClr val="accent1"/>
+            </a:fillRef>
+            <a:effectRef idx="0">
+              <a:schemeClr val="accent1"/>
+            </a:effectRef>
+            <a:fontRef idx="minor">
+              <a:schemeClr val="lt1"/>
+            </a:fontRef>
+          </p:style>
+          <p:txBody>
+            <a:bodyPr rtlCol="0" anchor="ctr"/>
+            <a:lstStyle/>
+            <a:p>
+              <a:pPr algn="ctr"/>
+              <a:endParaRPr lang="en-US" dirty="0"/>
+            </a:p>
+          </p:txBody>
+        </p:sp>
+        <p:sp>
+          <p:nvSpPr>
+            <p:cNvPr id="8" name="TextBox 7">
+              <a:extLst>
+                <a:ext uri="{FF2B5EF4-FFF2-40B4-BE49-F238E27FC236}">
+                  <a16:creationId xmlns:a16="http://schemas.microsoft.com/office/drawing/2014/main" id="{3FE07946-CE88-6040-B682-D30118903E29}"/>
+                </a:ext>
+              </a:extLst>
+            </p:cNvPr>
+            <p:cNvSpPr txBox="1"/>
+            <p:nvPr/>
+          </p:nvSpPr>
+          <p:spPr>
+            <a:xfrm>
+              <a:off x="3534502" y="6309827"/>
+              <a:ext cx="5129976" cy="584775"/>
+            </a:xfrm>
+            <a:prstGeom prst="rect">
+              <a:avLst/>
+            </a:prstGeom>
+            <a:noFill/>
+          </p:spPr>
+          <p:txBody>
+            <a:bodyPr wrap="square" rtlCol="0" anchor="ctr">
+              <a:spAutoFit/>
+            </a:bodyPr>
+            <a:lstStyle/>
+            <a:p>
+              <a:pPr algn="ctr"/>
+              <a:r>
+                <a:rPr lang="en-US" sz="3200" b="1" dirty="0">
+                  <a:solidFill>
+                    <a:schemeClr val="bg1">
+                      <a:lumMod val="95000"/>
+                    </a:schemeClr>
+                  </a:solidFill>
+                  <a:effectLst>
+                    <a:outerShdw blurRad="50800" dist="38100" dir="2700000" algn="tl" rotWithShape="0">
+                      <a:prstClr val="black">
+                        <a:alpha val="40000"/>
+                      </a:prstClr>
+                    </a:outerShdw>
+                  </a:effectLst>
+                  <a:latin typeface="TH SarabunPSK" panose="020B0500040200020003" pitchFamily="34" charset="-34"/>
+                  <a:cs typeface="TH SarabunPSK" panose="020B0500040200020003" pitchFamily="34" charset="-34"/>
+                </a:rPr>
+                <a:t>August 4</a:t>
+              </a:r>
+              <a:r>
+                <a:rPr lang="en-US" sz="3200" b="1" baseline="30000" dirty="0">
+                  <a:solidFill>
+                    <a:schemeClr val="bg1">
+                      <a:lumMod val="95000"/>
+                    </a:schemeClr>
+                  </a:solidFill>
+                  <a:effectLst>
+                    <a:outerShdw blurRad="50800" dist="38100" dir="2700000" algn="tl" rotWithShape="0">
+                      <a:prstClr val="black">
+                        <a:alpha val="40000"/>
+                      </a:prstClr>
+                    </a:outerShdw>
+                  </a:effectLst>
+                  <a:latin typeface="TH SarabunPSK" panose="020B0500040200020003" pitchFamily="34" charset="-34"/>
+                  <a:cs typeface="TH SarabunPSK" panose="020B0500040200020003" pitchFamily="34" charset="-34"/>
+                </a:rPr>
+                <a:t>th</a:t>
+              </a:r>
+              <a:r>
+                <a:rPr lang="en-US" sz="3200" b="1" dirty="0">
+                  <a:solidFill>
+                    <a:schemeClr val="bg1">
+                      <a:lumMod val="95000"/>
+                    </a:schemeClr>
+                  </a:solidFill>
+                  <a:effectLst>
+                    <a:outerShdw blurRad="50800" dist="38100" dir="2700000" algn="tl" rotWithShape="0">
+                      <a:prstClr val="black">
+                        <a:alpha val="40000"/>
+                      </a:prstClr>
+                    </a:outerShdw>
+                  </a:effectLst>
+                  <a:latin typeface="TH SarabunPSK" panose="020B0500040200020003" pitchFamily="34" charset="-34"/>
+                  <a:cs typeface="TH SarabunPSK" panose="020B0500040200020003" pitchFamily="34" charset="-34"/>
+                </a:rPr>
+                <a:t>, 2019</a:t>
+              </a:r>
+            </a:p>
+          </p:txBody>
+        </p:sp>
+      </p:grpSp>
+      <p:sp>
+        <p:nvSpPr>
+          <p:cNvPr id="12" name="TextBox 11">
+            <a:extLst>
+              <a:ext uri="{FF2B5EF4-FFF2-40B4-BE49-F238E27FC236}">
+                <a16:creationId xmlns:a16="http://schemas.microsoft.com/office/drawing/2014/main" id="{94D496AC-E427-B049-98F6-7675B32DD83F}"/>
+              </a:ext>
+            </a:extLst>
+          </p:cNvPr>
+          <p:cNvSpPr txBox="1"/>
+          <p:nvPr/>
+        </p:nvSpPr>
+        <p:spPr>
+          <a:xfrm>
+            <a:off x="2425994" y="1653623"/>
+            <a:ext cx="7436961" cy="3785652"/>
+          </a:xfrm>
+          <a:prstGeom prst="rect">
+            <a:avLst/>
+          </a:prstGeom>
+          <a:noFill/>
+        </p:spPr>
+        <p:txBody>
+          <a:bodyPr wrap="square" rtlCol="0" anchor="ctr">
+            <a:spAutoFit/>
+          </a:bodyPr>
+          <a:lstStyle/>
+          <a:p>
+            <a:pPr algn="ctr"/>
+            <a:r>
+              <a:rPr lang="en-US" sz="4000" dirty="0">
+                <a:solidFill>
+                  <a:schemeClr val="bg1">
+                    <a:lumMod val="95000"/>
+                  </a:schemeClr>
+                </a:solidFill>
+                <a:effectLst>
+                  <a:outerShdw blurRad="50800" dist="38100" dir="2700000" algn="tl" rotWithShape="0">
+                    <a:prstClr val="black">
+                      <a:alpha val="40000"/>
+                    </a:prstClr>
+                  </a:outerShdw>
+                </a:effectLst>
+                <a:latin typeface="TH SarabunPSK" panose="020B0500040200020003" pitchFamily="34" charset="-34"/>
+                <a:cs typeface="TH SarabunPSK" panose="020B0500040200020003" pitchFamily="34" charset="-34"/>
+              </a:rPr>
+              <a:t>We will be offline shortly as we restart the</a:t>
+            </a:r>
+          </a:p>
+          <a:p>
+            <a:pPr algn="ctr"/>
+            <a:r>
+              <a:rPr lang="en-US" sz="4000" dirty="0">
+                <a:solidFill>
+                  <a:schemeClr val="bg1">
+                    <a:lumMod val="95000"/>
+                  </a:schemeClr>
+                </a:solidFill>
+                <a:effectLst>
+                  <a:outerShdw blurRad="50800" dist="38100" dir="2700000" algn="tl" rotWithShape="0">
+                    <a:prstClr val="black">
+                      <a:alpha val="40000"/>
+                    </a:prstClr>
+                  </a:outerShdw>
+                </a:effectLst>
+                <a:latin typeface="TH SarabunPSK" panose="020B0500040200020003" pitchFamily="34" charset="-34"/>
+                <a:cs typeface="TH SarabunPSK" panose="020B0500040200020003" pitchFamily="34" charset="-34"/>
+              </a:rPr>
+              <a:t>broadcast system.</a:t>
+            </a:r>
+          </a:p>
+          <a:p>
+            <a:pPr algn="ctr"/>
+            <a:endParaRPr lang="en-US" sz="4000" dirty="0">
+              <a:solidFill>
+                <a:schemeClr val="bg1">
+                  <a:lumMod val="95000"/>
+                </a:schemeClr>
+              </a:solidFill>
+              <a:effectLst>
+                <a:outerShdw blurRad="50800" dist="38100" dir="2700000" algn="tl" rotWithShape="0">
+                  <a:prstClr val="black">
+                    <a:alpha val="40000"/>
+                  </a:prstClr>
+                </a:outerShdw>
+              </a:effectLst>
+              <a:latin typeface="TH SarabunPSK" panose="020B0500040200020003" pitchFamily="34" charset="-34"/>
+              <a:cs typeface="TH SarabunPSK" panose="020B0500040200020003" pitchFamily="34" charset="-34"/>
+            </a:endParaRPr>
+          </a:p>
+          <a:p>
+            <a:pPr algn="ctr"/>
+            <a:r>
+              <a:rPr lang="en-US" sz="4000" dirty="0">
+                <a:solidFill>
+                  <a:schemeClr val="bg1">
+                    <a:lumMod val="95000"/>
+                  </a:schemeClr>
+                </a:solidFill>
+                <a:effectLst>
+                  <a:outerShdw blurRad="50800" dist="38100" dir="2700000" algn="tl" rotWithShape="0">
+                    <a:prstClr val="black">
+                      <a:alpha val="40000"/>
+                    </a:prstClr>
+                  </a:outerShdw>
+                </a:effectLst>
+                <a:latin typeface="TH SarabunPSK" panose="020B0500040200020003" pitchFamily="34" charset="-34"/>
+                <a:cs typeface="TH SarabunPSK" panose="020B0500040200020003" pitchFamily="34" charset="-34"/>
+              </a:rPr>
+              <a:t>Once we’re back, we will also be live on</a:t>
+            </a:r>
+          </a:p>
+          <a:p>
+            <a:pPr algn="ctr"/>
+            <a:r>
+              <a:rPr lang="en-US" sz="4000" dirty="0">
+                <a:solidFill>
+                  <a:schemeClr val="bg1">
+                    <a:lumMod val="95000"/>
+                  </a:schemeClr>
+                </a:solidFill>
+                <a:effectLst>
+                  <a:outerShdw blurRad="50800" dist="38100" dir="2700000" algn="tl" rotWithShape="0">
+                    <a:prstClr val="black">
+                      <a:alpha val="40000"/>
+                    </a:prstClr>
+                  </a:outerShdw>
+                </a:effectLst>
+                <a:latin typeface="TH SarabunPSK" panose="020B0500040200020003" pitchFamily="34" charset="-34"/>
+                <a:cs typeface="TH SarabunPSK" panose="020B0500040200020003" pitchFamily="34" charset="-34"/>
+              </a:rPr>
+              <a:t>Facebook at:</a:t>
+            </a:r>
+          </a:p>
+          <a:p>
+            <a:pPr algn="ctr"/>
+            <a:r>
+              <a:rPr lang="en-US" sz="3600" b="1" dirty="0">
+                <a:solidFill>
+                  <a:srgbClr val="00F2F0"/>
+                </a:solidFill>
+                <a:effectLst>
+                  <a:outerShdw blurRad="50800" dist="38100" dir="2700000" algn="tl" rotWithShape="0">
+                    <a:prstClr val="black">
+                      <a:alpha val="40000"/>
+                    </a:prstClr>
+                  </a:outerShdw>
+                </a:effectLst>
+                <a:latin typeface="TH SarabunPSK" panose="020B0500040200020003" pitchFamily="34" charset="-34"/>
+                <a:cs typeface="TH SarabunPSK" panose="020B0500040200020003" pitchFamily="34" charset="-34"/>
+              </a:rPr>
+              <a:t>https://</a:t>
+            </a:r>
+            <a:r>
+              <a:rPr lang="en-US" sz="3600" b="1" dirty="0" err="1">
+                <a:solidFill>
+                  <a:srgbClr val="00F2F0"/>
+                </a:solidFill>
+                <a:effectLst>
+                  <a:outerShdw blurRad="50800" dist="38100" dir="2700000" algn="tl" rotWithShape="0">
+                    <a:prstClr val="black">
+                      <a:alpha val="40000"/>
+                    </a:prstClr>
+                  </a:outerShdw>
+                </a:effectLst>
+                <a:latin typeface="TH SarabunPSK" panose="020B0500040200020003" pitchFamily="34" charset="-34"/>
+                <a:cs typeface="TH SarabunPSK" panose="020B0500040200020003" pitchFamily="34" charset="-34"/>
+              </a:rPr>
+              <a:t>facebook.com</a:t>
+            </a:r>
+            <a:r>
+              <a:rPr lang="en-US" sz="3600" b="1" dirty="0">
+                <a:solidFill>
+                  <a:srgbClr val="00F2F0"/>
+                </a:solidFill>
+                <a:effectLst>
+                  <a:outerShdw blurRad="50800" dist="38100" dir="2700000" algn="tl" rotWithShape="0">
+                    <a:prstClr val="black">
+                      <a:alpha val="40000"/>
+                    </a:prstClr>
+                  </a:outerShdw>
+                </a:effectLst>
+                <a:latin typeface="TH SarabunPSK" panose="020B0500040200020003" pitchFamily="34" charset="-34"/>
+                <a:cs typeface="TH SarabunPSK" panose="020B0500040200020003" pitchFamily="34" charset="-34"/>
+              </a:rPr>
+              <a:t>/</a:t>
+            </a:r>
+            <a:r>
+              <a:rPr lang="en-US" sz="3600" b="1">
+                <a:solidFill>
+                  <a:srgbClr val="00F2F0"/>
+                </a:solidFill>
+                <a:effectLst>
+                  <a:outerShdw blurRad="50800" dist="38100" dir="2700000" algn="tl" rotWithShape="0">
+                    <a:prstClr val="black">
+                      <a:alpha val="40000"/>
+                    </a:prstClr>
+                  </a:outerShdw>
+                </a:effectLst>
+                <a:latin typeface="TH SarabunPSK" panose="020B0500040200020003" pitchFamily="34" charset="-34"/>
+                <a:cs typeface="TH SarabunPSK" panose="020B0500040200020003" pitchFamily="34" charset="-34"/>
+              </a:rPr>
+              <a:t>zarahemlabranch</a:t>
+            </a:r>
+            <a:endParaRPr lang="en-US" sz="3600" b="1" dirty="0">
+              <a:solidFill>
+                <a:srgbClr val="00F2F0"/>
+              </a:solidFill>
+              <a:effectLst>
+                <a:outerShdw blurRad="50800" dist="38100" dir="2700000" algn="tl" rotWithShape="0">
+                  <a:prstClr val="black">
+                    <a:alpha val="40000"/>
+                  </a:prstClr>
+                </a:outerShdw>
+              </a:effectLst>
+              <a:latin typeface="TH SarabunPSK" panose="020B0500040200020003" pitchFamily="34" charset="-34"/>
+              <a:cs typeface="TH SarabunPSK" panose="020B0500040200020003" pitchFamily="34" charset="-34"/>
+            </a:endParaRPr>
+          </a:p>
+        </p:txBody>
+      </p:sp>
+      <p:sp>
+        <p:nvSpPr>
+          <p:cNvPr id="13" name="Rectangle 12">
+            <a:extLst>
+              <a:ext uri="{FF2B5EF4-FFF2-40B4-BE49-F238E27FC236}">
+                <a16:creationId xmlns:a16="http://schemas.microsoft.com/office/drawing/2014/main" id="{AB492FFC-07C3-9943-9A25-C78D524C9E4C}"/>
+              </a:ext>
+            </a:extLst>
+          </p:cNvPr>
+          <p:cNvSpPr/>
+          <p:nvPr/>
+        </p:nvSpPr>
+        <p:spPr>
+          <a:xfrm>
+            <a:off x="-226566" y="1211021"/>
+            <a:ext cx="12742083" cy="114588"/>
+          </a:xfrm>
+          <a:prstGeom prst="rect">
+            <a:avLst/>
+          </a:prstGeom>
+          <a:gradFill flip="none" rotWithShape="1">
+            <a:gsLst>
+              <a:gs pos="0">
+                <a:srgbClr val="BFB097">
+                  <a:alpha val="47000"/>
+                </a:srgbClr>
+              </a:gs>
+              <a:gs pos="50000">
+                <a:srgbClr val="BFB097"/>
+              </a:gs>
+              <a:gs pos="100000">
+                <a:srgbClr val="BFB097">
+                  <a:alpha val="50000"/>
+                </a:srgbClr>
+              </a:gs>
+            </a:gsLst>
+            <a:lin ang="0" scaled="1"/>
+            <a:tileRect/>
+          </a:gradFill>
           <a:ln>
             <a:noFill/>
           </a:ln>
-          <a:effectLst>
-            <a:outerShdw blurRad="50800" dist="38100" dir="8100000" algn="tr" rotWithShape="0">
-              <a:prstClr val="black">
-                <a:alpha val="40000"/>
-              </a:prstClr>
-            </a:outerShdw>
-          </a:effectLst>
         </p:spPr>
         <p:style>
           <a:lnRef idx="2">
@@ -3391,16 +3879,47 @@
           <a:bodyPr rtlCol="0" anchor="ctr"/>
           <a:lstStyle/>
           <a:p>
-            <a:endParaRPr lang="en-US" sz="2000" dirty="0"/>
-          </a:p>
-        </p:txBody>
-      </p:sp>
-      <p:sp>
-        <p:nvSpPr>
-          <p:cNvPr id="5" name="Rectangle 4">
-            <a:extLst>
-              <a:ext uri="{FF2B5EF4-FFF2-40B4-BE49-F238E27FC236}">
-                <a16:creationId xmlns:a16="http://schemas.microsoft.com/office/drawing/2014/main" id="{4627FB8D-27CF-40C1-BAD9-F4A747DFD90C}"/>
+            <a:pPr algn="ctr"/>
+            <a:endParaRPr lang="en-US"/>
+          </a:p>
+        </p:txBody>
+      </p:sp>
+    </p:spTree>
+    <p:extLst>
+      <p:ext uri="{BB962C8B-B14F-4D97-AF65-F5344CB8AC3E}">
+        <p14:creationId xmlns:p14="http://schemas.microsoft.com/office/powerpoint/2010/main" val="2849740978"/>
+      </p:ext>
+    </p:extLst>
+  </p:cSld>
+  <p:clrMapOvr>
+    <a:masterClrMapping/>
+  </p:clrMapOvr>
+</p:sld>
+</file>
+
+<file path=ppt/slides/slide2.xml><?xml version="1.0" encoding="utf-8"?>
+<p:sld xmlns:a="http://schemas.openxmlformats.org/drawingml/2006/main" xmlns:r="http://schemas.openxmlformats.org/officeDocument/2006/relationships" xmlns:p="http://schemas.openxmlformats.org/presentationml/2006/main">
+  <p:cSld>
+    <p:spTree>
+      <p:nvGrpSpPr>
+        <p:cNvPr id="1" name=""/>
+        <p:cNvGrpSpPr/>
+        <p:nvPr/>
+      </p:nvGrpSpPr>
+      <p:grpSpPr>
+        <a:xfrm>
+          <a:off x="0" y="0"/>
+          <a:ext cx="0" cy="0"/>
+          <a:chOff x="0" y="0"/>
+          <a:chExt cx="0" cy="0"/>
+        </a:xfrm>
+      </p:grpSpPr>
+      <p:sp>
+        <p:nvSpPr>
+          <p:cNvPr id="12" name="Rectangle 11">
+            <a:extLst>
+              <a:ext uri="{FF2B5EF4-FFF2-40B4-BE49-F238E27FC236}">
+                <a16:creationId xmlns:a16="http://schemas.microsoft.com/office/drawing/2014/main" id="{EF12C80C-9111-A749-AF96-13D07F137ED4}"/>
               </a:ext>
             </a:extLst>
           </p:cNvPr>
@@ -3409,28 +3928,19 @@
         </p:nvSpPr>
         <p:spPr>
           <a:xfrm>
-            <a:off x="-1" y="4312993"/>
-            <a:ext cx="5197034" cy="583097"/>
+            <a:off x="0" y="4443673"/>
+            <a:ext cx="5220182" cy="619031"/>
           </a:xfrm>
           <a:prstGeom prst="rect">
             <a:avLst/>
           </a:prstGeom>
           <a:solidFill>
-            <a:schemeClr val="tx1">
-              <a:lumMod val="85000"/>
-              <a:lumOff val="15000"/>
-            </a:schemeClr>
+            <a:srgbClr val="1E231D"/>
           </a:solidFill>
           <a:ln>
             <a:noFill/>
           </a:ln>
-          <a:effectLst>
-            <a:outerShdw blurRad="50800" dist="38100" dir="8100000" algn="tr" rotWithShape="0">
-              <a:prstClr val="black">
-                <a:alpha val="40000"/>
-              </a:prstClr>
-            </a:outerShdw>
-          </a:effectLst>
+          <a:effectLst/>
         </p:spPr>
         <p:style>
           <a:lnRef idx="2">
@@ -3452,17 +3962,16 @@
           <a:bodyPr rtlCol="0" anchor="ctr"/>
           <a:lstStyle/>
           <a:p>
-            <a:pPr algn="r"/>
-            <a:endParaRPr lang="en-US" sz="2400" dirty="0"/>
-          </a:p>
-        </p:txBody>
-      </p:sp>
-      <p:sp>
-        <p:nvSpPr>
-          <p:cNvPr id="3" name="Rectangle 2">
-            <a:extLst>
-              <a:ext uri="{FF2B5EF4-FFF2-40B4-BE49-F238E27FC236}">
-                <a16:creationId xmlns:a16="http://schemas.microsoft.com/office/drawing/2014/main" id="{B97B6493-7E1B-4617-91A9-C6E89747FF79}"/>
+            <a:endParaRPr lang="en-US" sz="2000" dirty="0"/>
+          </a:p>
+        </p:txBody>
+      </p:sp>
+      <p:sp>
+        <p:nvSpPr>
+          <p:cNvPr id="4" name="Rectangle 3">
+            <a:extLst>
+              <a:ext uri="{FF2B5EF4-FFF2-40B4-BE49-F238E27FC236}">
+                <a16:creationId xmlns:a16="http://schemas.microsoft.com/office/drawing/2014/main" id="{EEE063DD-EC15-4B4A-9487-01BF8525900C}"/>
               </a:ext>
             </a:extLst>
           </p:cNvPr>
@@ -3471,14 +3980,884 @@
         </p:nvSpPr>
         <p:spPr>
           <a:xfrm>
-            <a:off x="-2" y="4815064"/>
-            <a:ext cx="10116273" cy="150471"/>
+            <a:off x="0" y="5010762"/>
+            <a:ext cx="12192000" cy="1298078"/>
           </a:xfrm>
           <a:prstGeom prst="rect">
             <a:avLst/>
           </a:prstGeom>
           <a:solidFill>
-            <a:srgbClr val="C7CAB2"/>
+            <a:srgbClr val="1E231D"/>
+          </a:solidFill>
+          <a:ln>
+            <a:noFill/>
+          </a:ln>
+          <a:effectLst/>
+        </p:spPr>
+        <p:style>
+          <a:lnRef idx="2">
+            <a:schemeClr val="accent1">
+              <a:shade val="50000"/>
+            </a:schemeClr>
+          </a:lnRef>
+          <a:fillRef idx="1">
+            <a:schemeClr val="accent1"/>
+          </a:fillRef>
+          <a:effectRef idx="0">
+            <a:schemeClr val="accent1"/>
+          </a:effectRef>
+          <a:fontRef idx="minor">
+            <a:schemeClr val="lt1"/>
+          </a:fontRef>
+        </p:style>
+        <p:txBody>
+          <a:bodyPr rtlCol="0" anchor="ctr"/>
+          <a:lstStyle/>
+          <a:p>
+            <a:endParaRPr lang="en-US" sz="2000" dirty="0"/>
+          </a:p>
+        </p:txBody>
+      </p:sp>
+      <p:sp>
+        <p:nvSpPr>
+          <p:cNvPr id="7" name="TextBox 6">
+            <a:extLst>
+              <a:ext uri="{FF2B5EF4-FFF2-40B4-BE49-F238E27FC236}">
+                <a16:creationId xmlns:a16="http://schemas.microsoft.com/office/drawing/2014/main" id="{6D930DDE-99BB-474F-B00B-5C29C77767DD}"/>
+              </a:ext>
+            </a:extLst>
+          </p:cNvPr>
+          <p:cNvSpPr txBox="1"/>
+          <p:nvPr/>
+        </p:nvSpPr>
+        <p:spPr>
+          <a:xfrm>
+            <a:off x="707807" y="4418555"/>
+            <a:ext cx="6097672" cy="707886"/>
+          </a:xfrm>
+          <a:prstGeom prst="rect">
+            <a:avLst/>
+          </a:prstGeom>
+          <a:noFill/>
+        </p:spPr>
+        <p:txBody>
+          <a:bodyPr wrap="square" rtlCol="0">
+            <a:spAutoFit/>
+          </a:bodyPr>
+          <a:lstStyle/>
+          <a:p>
+            <a:r>
+              <a:rPr lang="en-US" sz="4000" b="1" dirty="0">
+                <a:solidFill>
+                  <a:schemeClr val="bg1">
+                    <a:lumMod val="95000"/>
+                  </a:schemeClr>
+                </a:solidFill>
+                <a:latin typeface="TH SarabunPSK" panose="020B0500040200020003" pitchFamily="34" charset="-34"/>
+                <a:ea typeface="Open Sans Light" panose="020B0306030504020204" pitchFamily="34" charset="0"/>
+                <a:cs typeface="TH SarabunPSK" panose="020B0500040200020003" pitchFamily="34" charset="-34"/>
+              </a:rPr>
+              <a:t>Choppy Video?</a:t>
+            </a:r>
+          </a:p>
+        </p:txBody>
+      </p:sp>
+      <p:sp>
+        <p:nvSpPr>
+          <p:cNvPr id="8" name="TextBox 7">
+            <a:extLst>
+              <a:ext uri="{FF2B5EF4-FFF2-40B4-BE49-F238E27FC236}">
+                <a16:creationId xmlns:a16="http://schemas.microsoft.com/office/drawing/2014/main" id="{3FE07946-CE88-6040-B682-D30118903E29}"/>
+              </a:ext>
+            </a:extLst>
+          </p:cNvPr>
+          <p:cNvSpPr txBox="1"/>
+          <p:nvPr/>
+        </p:nvSpPr>
+        <p:spPr>
+          <a:xfrm>
+            <a:off x="566622" y="5114647"/>
+            <a:ext cx="5129976" cy="523220"/>
+          </a:xfrm>
+          <a:prstGeom prst="rect">
+            <a:avLst/>
+          </a:prstGeom>
+          <a:noFill/>
+        </p:spPr>
+        <p:txBody>
+          <a:bodyPr wrap="square" rtlCol="0">
+            <a:spAutoFit/>
+          </a:bodyPr>
+          <a:lstStyle/>
+          <a:p>
+            <a:r>
+              <a:rPr lang="en-US" sz="2800" dirty="0">
+                <a:solidFill>
+                  <a:schemeClr val="bg1">
+                    <a:lumMod val="95000"/>
+                  </a:schemeClr>
+                </a:solidFill>
+                <a:latin typeface="TH SarabunPSK" panose="020B0500040200020003" pitchFamily="34" charset="-34"/>
+                <a:cs typeface="TH SarabunPSK" panose="020B0500040200020003" pitchFamily="34" charset="-34"/>
+              </a:rPr>
+              <a:t>This service is also live on Facebook at:</a:t>
+            </a:r>
+          </a:p>
+        </p:txBody>
+      </p:sp>
+      <p:pic>
+        <p:nvPicPr>
+          <p:cNvPr id="9" name="Picture 8">
+            <a:extLst>
+              <a:ext uri="{FF2B5EF4-FFF2-40B4-BE49-F238E27FC236}">
+                <a16:creationId xmlns:a16="http://schemas.microsoft.com/office/drawing/2014/main" id="{B13DE8D1-ABFD-1841-92B6-A3DD18750BC1}"/>
+              </a:ext>
+            </a:extLst>
+          </p:cNvPr>
+          <p:cNvPicPr>
+            <a:picLocks noChangeAspect="1"/>
+          </p:cNvPicPr>
+          <p:nvPr/>
+        </p:nvPicPr>
+        <p:blipFill rotWithShape="1">
+          <a:blip r:embed="rId2">
+            <a:extLst>
+              <a:ext uri="{28A0092B-C50C-407E-A947-70E740481C1C}">
+                <a14:useLocalDpi xmlns:a14="http://schemas.microsoft.com/office/drawing/2010/main" val="0"/>
+              </a:ext>
+            </a:extLst>
+          </a:blip>
+          <a:srcRect l="63174" t="73064" r="1" b="8008"/>
+          <a:stretch/>
+        </p:blipFill>
+        <p:spPr>
+          <a:xfrm rot="10800000">
+            <a:off x="7702189" y="5010762"/>
+            <a:ext cx="4489810" cy="1298078"/>
+          </a:xfrm>
+          <a:prstGeom prst="rect">
+            <a:avLst/>
+          </a:prstGeom>
+        </p:spPr>
+      </p:pic>
+      <p:grpSp>
+        <p:nvGrpSpPr>
+          <p:cNvPr id="3" name="Group 2">
+            <a:extLst>
+              <a:ext uri="{FF2B5EF4-FFF2-40B4-BE49-F238E27FC236}">
+                <a16:creationId xmlns:a16="http://schemas.microsoft.com/office/drawing/2014/main" id="{1CF83C16-C07D-4143-860F-217A6D0B4645}"/>
+              </a:ext>
+            </a:extLst>
+          </p:cNvPr>
+          <p:cNvGrpSpPr/>
+          <p:nvPr/>
+        </p:nvGrpSpPr>
+        <p:grpSpPr>
+          <a:xfrm>
+            <a:off x="9933240" y="4745401"/>
+            <a:ext cx="1828800" cy="1828800"/>
+            <a:chOff x="182879" y="4745402"/>
+            <a:chExt cx="1828800" cy="1828800"/>
+          </a:xfrm>
+        </p:grpSpPr>
+        <p:sp>
+          <p:nvSpPr>
+            <p:cNvPr id="6" name="Rectangle 5">
+              <a:extLst>
+                <a:ext uri="{FF2B5EF4-FFF2-40B4-BE49-F238E27FC236}">
+                  <a16:creationId xmlns:a16="http://schemas.microsoft.com/office/drawing/2014/main" id="{1D14CBE5-B75D-F54F-B42B-3E0A703C8F48}"/>
+                </a:ext>
+              </a:extLst>
+            </p:cNvPr>
+            <p:cNvSpPr/>
+            <p:nvPr/>
+          </p:nvSpPr>
+          <p:spPr>
+            <a:xfrm>
+              <a:off x="182879" y="4745402"/>
+              <a:ext cx="1828800" cy="1828800"/>
+            </a:xfrm>
+            <a:prstGeom prst="rect">
+              <a:avLst/>
+            </a:prstGeom>
+            <a:solidFill>
+              <a:srgbClr val="1E231D"/>
+            </a:solidFill>
+            <a:ln w="38100">
+              <a:solidFill>
+                <a:srgbClr val="BFB097"/>
+              </a:solidFill>
+            </a:ln>
+            <a:effectLst/>
+          </p:spPr>
+          <p:style>
+            <a:lnRef idx="2">
+              <a:schemeClr val="accent1">
+                <a:shade val="50000"/>
+              </a:schemeClr>
+            </a:lnRef>
+            <a:fillRef idx="1">
+              <a:schemeClr val="accent1"/>
+            </a:fillRef>
+            <a:effectRef idx="0">
+              <a:schemeClr val="accent1"/>
+            </a:effectRef>
+            <a:fontRef idx="minor">
+              <a:schemeClr val="lt1"/>
+            </a:fontRef>
+          </p:style>
+          <p:txBody>
+            <a:bodyPr rtlCol="0" anchor="ctr"/>
+            <a:lstStyle/>
+            <a:p>
+              <a:endParaRPr lang="en-US" sz="2000" dirty="0"/>
+            </a:p>
+          </p:txBody>
+        </p:sp>
+        <p:sp>
+          <p:nvSpPr>
+            <p:cNvPr id="2" name="TextBox 1">
+              <a:extLst>
+                <a:ext uri="{FF2B5EF4-FFF2-40B4-BE49-F238E27FC236}">
+                  <a16:creationId xmlns:a16="http://schemas.microsoft.com/office/drawing/2014/main" id="{CC7D800F-D3D2-FF4B-A3C6-3E55C357303B}"/>
+                </a:ext>
+              </a:extLst>
+            </p:cNvPr>
+            <p:cNvSpPr txBox="1"/>
+            <p:nvPr/>
+          </p:nvSpPr>
+          <p:spPr>
+            <a:xfrm>
+              <a:off x="182879" y="5147388"/>
+              <a:ext cx="1828800" cy="1077218"/>
+            </a:xfrm>
+            <a:prstGeom prst="rect">
+              <a:avLst/>
+            </a:prstGeom>
+            <a:noFill/>
+          </p:spPr>
+          <p:txBody>
+            <a:bodyPr wrap="square" rtlCol="0" anchor="ctr">
+              <a:spAutoFit/>
+            </a:bodyPr>
+            <a:lstStyle/>
+            <a:p>
+              <a:pPr algn="ctr"/>
+              <a:r>
+                <a:rPr lang="en-US" sz="3200" dirty="0">
+                  <a:solidFill>
+                    <a:schemeClr val="bg1">
+                      <a:lumMod val="95000"/>
+                    </a:schemeClr>
+                  </a:solidFill>
+                  <a:latin typeface="Pristina" panose="03060402040406080204" pitchFamily="66" charset="77"/>
+                </a:rPr>
+                <a:t>Zarahemla</a:t>
+              </a:r>
+            </a:p>
+            <a:p>
+              <a:pPr algn="ctr"/>
+              <a:r>
+                <a:rPr lang="en-US" sz="3200" dirty="0">
+                  <a:solidFill>
+                    <a:schemeClr val="bg1">
+                      <a:lumMod val="95000"/>
+                    </a:schemeClr>
+                  </a:solidFill>
+                  <a:latin typeface="Pristina" panose="03060402040406080204" pitchFamily="66" charset="77"/>
+                </a:rPr>
+                <a:t>Branch</a:t>
+              </a:r>
+            </a:p>
+          </p:txBody>
+        </p:sp>
+      </p:grpSp>
+      <p:sp>
+        <p:nvSpPr>
+          <p:cNvPr id="11" name="TextBox 10">
+            <a:extLst>
+              <a:ext uri="{FF2B5EF4-FFF2-40B4-BE49-F238E27FC236}">
+                <a16:creationId xmlns:a16="http://schemas.microsoft.com/office/drawing/2014/main" id="{2FD2C251-8664-3645-AC2E-7459720FAB54}"/>
+              </a:ext>
+            </a:extLst>
+          </p:cNvPr>
+          <p:cNvSpPr txBox="1"/>
+          <p:nvPr/>
+        </p:nvSpPr>
+        <p:spPr>
+          <a:xfrm>
+            <a:off x="707807" y="5516719"/>
+            <a:ext cx="7096587" cy="707886"/>
+          </a:xfrm>
+          <a:prstGeom prst="rect">
+            <a:avLst/>
+          </a:prstGeom>
+          <a:noFill/>
+        </p:spPr>
+        <p:txBody>
+          <a:bodyPr wrap="square" rtlCol="0">
+            <a:spAutoFit/>
+          </a:bodyPr>
+          <a:lstStyle/>
+          <a:p>
+            <a:r>
+              <a:rPr lang="en-US" sz="4000" b="1" dirty="0" err="1">
+                <a:solidFill>
+                  <a:schemeClr val="bg1">
+                    <a:lumMod val="95000"/>
+                  </a:schemeClr>
+                </a:solidFill>
+                <a:latin typeface="TH SarabunPSK" panose="020B0500040200020003" pitchFamily="34" charset="-34"/>
+                <a:ea typeface="Open Sans Light" panose="020B0306030504020204" pitchFamily="34" charset="0"/>
+                <a:cs typeface="TH SarabunPSK" panose="020B0500040200020003" pitchFamily="34" charset="-34"/>
+              </a:rPr>
+              <a:t>facebook.com</a:t>
+            </a:r>
+            <a:r>
+              <a:rPr lang="en-US" sz="4000" b="1" dirty="0">
+                <a:solidFill>
+                  <a:schemeClr val="bg1">
+                    <a:lumMod val="95000"/>
+                  </a:schemeClr>
+                </a:solidFill>
+                <a:latin typeface="TH SarabunPSK" panose="020B0500040200020003" pitchFamily="34" charset="-34"/>
+                <a:ea typeface="Open Sans Light" panose="020B0306030504020204" pitchFamily="34" charset="0"/>
+                <a:cs typeface="TH SarabunPSK" panose="020B0500040200020003" pitchFamily="34" charset="-34"/>
+              </a:rPr>
+              <a:t>/</a:t>
+            </a:r>
+            <a:r>
+              <a:rPr lang="en-US" sz="4000" b="1" dirty="0" err="1">
+                <a:solidFill>
+                  <a:schemeClr val="bg1">
+                    <a:lumMod val="95000"/>
+                  </a:schemeClr>
+                </a:solidFill>
+                <a:latin typeface="TH SarabunPSK" panose="020B0500040200020003" pitchFamily="34" charset="-34"/>
+                <a:ea typeface="Open Sans Light" panose="020B0306030504020204" pitchFamily="34" charset="0"/>
+                <a:cs typeface="TH SarabunPSK" panose="020B0500040200020003" pitchFamily="34" charset="-34"/>
+              </a:rPr>
+              <a:t>zarahemlabranch</a:t>
+            </a:r>
+            <a:endParaRPr lang="en-US" sz="4000" b="1" dirty="0">
+              <a:solidFill>
+                <a:schemeClr val="bg1">
+                  <a:lumMod val="95000"/>
+                </a:schemeClr>
+              </a:solidFill>
+              <a:latin typeface="TH SarabunPSK" panose="020B0500040200020003" pitchFamily="34" charset="-34"/>
+              <a:ea typeface="Open Sans Light" panose="020B0306030504020204" pitchFamily="34" charset="0"/>
+              <a:cs typeface="TH SarabunPSK" panose="020B0500040200020003" pitchFamily="34" charset="-34"/>
+            </a:endParaRPr>
+          </a:p>
+        </p:txBody>
+      </p:sp>
+    </p:spTree>
+    <p:extLst>
+      <p:ext uri="{BB962C8B-B14F-4D97-AF65-F5344CB8AC3E}">
+        <p14:creationId xmlns:p14="http://schemas.microsoft.com/office/powerpoint/2010/main" val="2724864543"/>
+      </p:ext>
+    </p:extLst>
+  </p:cSld>
+  <p:clrMapOvr>
+    <a:masterClrMapping/>
+  </p:clrMapOvr>
+</p:sld>
+</file>
+
+<file path=ppt/slides/slide3.xml><?xml version="1.0" encoding="utf-8"?>
+<p:sld xmlns:a="http://schemas.openxmlformats.org/drawingml/2006/main" xmlns:r="http://schemas.openxmlformats.org/officeDocument/2006/relationships" xmlns:p="http://schemas.openxmlformats.org/presentationml/2006/main">
+  <p:cSld>
+    <p:spTree>
+      <p:nvGrpSpPr>
+        <p:cNvPr id="1" name=""/>
+        <p:cNvGrpSpPr/>
+        <p:nvPr/>
+      </p:nvGrpSpPr>
+      <p:grpSpPr>
+        <a:xfrm>
+          <a:off x="0" y="0"/>
+          <a:ext cx="0" cy="0"/>
+          <a:chOff x="0" y="0"/>
+          <a:chExt cx="0" cy="0"/>
+        </a:xfrm>
+      </p:grpSpPr>
+      <p:grpSp>
+        <p:nvGrpSpPr>
+          <p:cNvPr id="10" name="Group 9">
+            <a:extLst>
+              <a:ext uri="{FF2B5EF4-FFF2-40B4-BE49-F238E27FC236}">
+                <a16:creationId xmlns:a16="http://schemas.microsoft.com/office/drawing/2014/main" id="{65069E47-387E-344A-B053-7067DAA4ACB9}"/>
+              </a:ext>
+            </a:extLst>
+          </p:cNvPr>
+          <p:cNvGrpSpPr/>
+          <p:nvPr/>
+        </p:nvGrpSpPr>
+        <p:grpSpPr>
+          <a:xfrm>
+            <a:off x="1313411" y="5091354"/>
+            <a:ext cx="10690167" cy="1119335"/>
+            <a:chOff x="1255776" y="5091352"/>
+            <a:chExt cx="10790547" cy="1119335"/>
+          </a:xfrm>
+        </p:grpSpPr>
+        <p:sp>
+          <p:nvSpPr>
+            <p:cNvPr id="4" name="Rectangle 3">
+              <a:extLst>
+                <a:ext uri="{FF2B5EF4-FFF2-40B4-BE49-F238E27FC236}">
+                  <a16:creationId xmlns:a16="http://schemas.microsoft.com/office/drawing/2014/main" id="{EEE063DD-EC15-4B4A-9487-01BF8525900C}"/>
+                </a:ext>
+              </a:extLst>
+            </p:cNvPr>
+            <p:cNvSpPr/>
+            <p:nvPr/>
+          </p:nvSpPr>
+          <p:spPr>
+            <a:xfrm>
+              <a:off x="1255776" y="5091352"/>
+              <a:ext cx="10790547" cy="1119335"/>
+            </a:xfrm>
+            <a:prstGeom prst="rect">
+              <a:avLst/>
+            </a:prstGeom>
+            <a:solidFill>
+              <a:srgbClr val="1E231D"/>
+            </a:solidFill>
+            <a:ln>
+              <a:noFill/>
+            </a:ln>
+            <a:effectLst/>
+          </p:spPr>
+          <p:style>
+            <a:lnRef idx="2">
+              <a:schemeClr val="accent1">
+                <a:shade val="50000"/>
+              </a:schemeClr>
+            </a:lnRef>
+            <a:fillRef idx="1">
+              <a:schemeClr val="accent1"/>
+            </a:fillRef>
+            <a:effectRef idx="0">
+              <a:schemeClr val="accent1"/>
+            </a:effectRef>
+            <a:fontRef idx="minor">
+              <a:schemeClr val="lt1"/>
+            </a:fontRef>
+          </p:style>
+          <p:txBody>
+            <a:bodyPr rtlCol="0" anchor="ctr"/>
+            <a:lstStyle/>
+            <a:p>
+              <a:endParaRPr lang="en-US" sz="2000" dirty="0"/>
+            </a:p>
+          </p:txBody>
+        </p:sp>
+        <p:pic>
+          <p:nvPicPr>
+            <p:cNvPr id="9" name="Picture 8">
+              <a:extLst>
+                <a:ext uri="{FF2B5EF4-FFF2-40B4-BE49-F238E27FC236}">
+                  <a16:creationId xmlns:a16="http://schemas.microsoft.com/office/drawing/2014/main" id="{B13DE8D1-ABFD-1841-92B6-A3DD18750BC1}"/>
+                </a:ext>
+              </a:extLst>
+            </p:cNvPr>
+            <p:cNvPicPr>
+              <a:picLocks noChangeAspect="1"/>
+            </p:cNvPicPr>
+            <p:nvPr/>
+          </p:nvPicPr>
+          <p:blipFill rotWithShape="1">
+            <a:blip r:embed="rId2">
+              <a:extLst>
+                <a:ext uri="{28A0092B-C50C-407E-A947-70E740481C1C}">
+                  <a14:useLocalDpi xmlns:a14="http://schemas.microsoft.com/office/drawing/2010/main" val="0"/>
+                </a:ext>
+              </a:extLst>
+            </a:blip>
+            <a:srcRect l="63174" t="73064" r="1" b="8008"/>
+            <a:stretch/>
+          </p:blipFill>
+          <p:spPr>
+            <a:xfrm rot="10800000">
+              <a:off x="8174754" y="5098311"/>
+              <a:ext cx="3871569" cy="1112376"/>
+            </a:xfrm>
+            <a:prstGeom prst="rect">
+              <a:avLst/>
+            </a:prstGeom>
+          </p:spPr>
+        </p:pic>
+      </p:grpSp>
+      <p:grpSp>
+        <p:nvGrpSpPr>
+          <p:cNvPr id="3" name="Group 2">
+            <a:extLst>
+              <a:ext uri="{FF2B5EF4-FFF2-40B4-BE49-F238E27FC236}">
+                <a16:creationId xmlns:a16="http://schemas.microsoft.com/office/drawing/2014/main" id="{1CF83C16-C07D-4143-860F-217A6D0B4645}"/>
+              </a:ext>
+            </a:extLst>
+          </p:cNvPr>
+          <p:cNvGrpSpPr/>
+          <p:nvPr/>
+        </p:nvGrpSpPr>
+        <p:grpSpPr>
+          <a:xfrm>
+            <a:off x="9787843" y="4736619"/>
+            <a:ext cx="1828800" cy="1828800"/>
+            <a:chOff x="182879" y="4745402"/>
+            <a:chExt cx="1828800" cy="1828800"/>
+          </a:xfrm>
+        </p:grpSpPr>
+        <p:sp>
+          <p:nvSpPr>
+            <p:cNvPr id="6" name="Rectangle 5">
+              <a:extLst>
+                <a:ext uri="{FF2B5EF4-FFF2-40B4-BE49-F238E27FC236}">
+                  <a16:creationId xmlns:a16="http://schemas.microsoft.com/office/drawing/2014/main" id="{1D14CBE5-B75D-F54F-B42B-3E0A703C8F48}"/>
+                </a:ext>
+              </a:extLst>
+            </p:cNvPr>
+            <p:cNvSpPr/>
+            <p:nvPr/>
+          </p:nvSpPr>
+          <p:spPr>
+            <a:xfrm>
+              <a:off x="182879" y="4745402"/>
+              <a:ext cx="1828800" cy="1828800"/>
+            </a:xfrm>
+            <a:prstGeom prst="rect">
+              <a:avLst/>
+            </a:prstGeom>
+            <a:solidFill>
+              <a:srgbClr val="1E231D"/>
+            </a:solidFill>
+            <a:ln w="38100">
+              <a:solidFill>
+                <a:srgbClr val="BFB097"/>
+              </a:solidFill>
+            </a:ln>
+            <a:effectLst/>
+          </p:spPr>
+          <p:style>
+            <a:lnRef idx="2">
+              <a:schemeClr val="accent1">
+                <a:shade val="50000"/>
+              </a:schemeClr>
+            </a:lnRef>
+            <a:fillRef idx="1">
+              <a:schemeClr val="accent1"/>
+            </a:fillRef>
+            <a:effectRef idx="0">
+              <a:schemeClr val="accent1"/>
+            </a:effectRef>
+            <a:fontRef idx="minor">
+              <a:schemeClr val="lt1"/>
+            </a:fontRef>
+          </p:style>
+          <p:txBody>
+            <a:bodyPr rtlCol="0" anchor="ctr"/>
+            <a:lstStyle/>
+            <a:p>
+              <a:endParaRPr lang="en-US" sz="2000" dirty="0"/>
+            </a:p>
+          </p:txBody>
+        </p:sp>
+        <p:sp>
+          <p:nvSpPr>
+            <p:cNvPr id="2" name="TextBox 1">
+              <a:extLst>
+                <a:ext uri="{FF2B5EF4-FFF2-40B4-BE49-F238E27FC236}">
+                  <a16:creationId xmlns:a16="http://schemas.microsoft.com/office/drawing/2014/main" id="{CC7D800F-D3D2-FF4B-A3C6-3E55C357303B}"/>
+                </a:ext>
+              </a:extLst>
+            </p:cNvPr>
+            <p:cNvSpPr txBox="1"/>
+            <p:nvPr/>
+          </p:nvSpPr>
+          <p:spPr>
+            <a:xfrm>
+              <a:off x="182879" y="5147388"/>
+              <a:ext cx="1828800" cy="1077218"/>
+            </a:xfrm>
+            <a:prstGeom prst="rect">
+              <a:avLst/>
+            </a:prstGeom>
+            <a:noFill/>
+          </p:spPr>
+          <p:txBody>
+            <a:bodyPr wrap="square" rtlCol="0" anchor="ctr">
+              <a:spAutoFit/>
+            </a:bodyPr>
+            <a:lstStyle/>
+            <a:p>
+              <a:pPr algn="ctr"/>
+              <a:r>
+                <a:rPr lang="en-US" sz="3200" dirty="0">
+                  <a:solidFill>
+                    <a:schemeClr val="bg1">
+                      <a:lumMod val="95000"/>
+                    </a:schemeClr>
+                  </a:solidFill>
+                  <a:latin typeface="Pristina" panose="03060402040406080204" pitchFamily="66" charset="77"/>
+                </a:rPr>
+                <a:t>Zarahemla</a:t>
+              </a:r>
+            </a:p>
+            <a:p>
+              <a:pPr algn="ctr"/>
+              <a:r>
+                <a:rPr lang="en-US" sz="3200" dirty="0">
+                  <a:solidFill>
+                    <a:schemeClr val="bg1">
+                      <a:lumMod val="95000"/>
+                    </a:schemeClr>
+                  </a:solidFill>
+                  <a:latin typeface="Pristina" panose="03060402040406080204" pitchFamily="66" charset="77"/>
+                </a:rPr>
+                <a:t>Branch</a:t>
+              </a:r>
+            </a:p>
+          </p:txBody>
+        </p:sp>
+      </p:grpSp>
+      <p:sp>
+        <p:nvSpPr>
+          <p:cNvPr id="7" name="TextBox 6">
+            <a:extLst>
+              <a:ext uri="{FF2B5EF4-FFF2-40B4-BE49-F238E27FC236}">
+                <a16:creationId xmlns:a16="http://schemas.microsoft.com/office/drawing/2014/main" id="{6D930DDE-99BB-474F-B00B-5C29C77767DD}"/>
+              </a:ext>
+            </a:extLst>
+          </p:cNvPr>
+          <p:cNvSpPr txBox="1"/>
+          <p:nvPr/>
+        </p:nvSpPr>
+        <p:spPr>
+          <a:xfrm>
+            <a:off x="1572490" y="5266302"/>
+            <a:ext cx="7870739" cy="769441"/>
+          </a:xfrm>
+          <a:prstGeom prst="rect">
+            <a:avLst/>
+          </a:prstGeom>
+          <a:noFill/>
+        </p:spPr>
+        <p:txBody>
+          <a:bodyPr wrap="square" rtlCol="0">
+            <a:spAutoFit/>
+          </a:bodyPr>
+          <a:lstStyle/>
+          <a:p>
+            <a:pPr algn="ctr"/>
+            <a:r>
+              <a:rPr lang="en-US" sz="4400" b="1" spc="100" dirty="0">
+                <a:solidFill>
+                  <a:schemeClr val="bg1">
+                    <a:lumMod val="95000"/>
+                  </a:schemeClr>
+                </a:solidFill>
+                <a:latin typeface="TH SarabunPSK" panose="020B0500040200020003" pitchFamily="34" charset="-34"/>
+                <a:ea typeface="Open Sans Light" panose="020B0306030504020204" pitchFamily="34" charset="0"/>
+                <a:cs typeface="TH SarabunPSK" panose="020B0500040200020003" pitchFamily="34" charset="-34"/>
+              </a:rPr>
+              <a:t>https://</a:t>
+            </a:r>
+            <a:r>
+              <a:rPr lang="en-US" sz="4400" b="1" spc="100" dirty="0" err="1">
+                <a:solidFill>
+                  <a:schemeClr val="bg1">
+                    <a:lumMod val="95000"/>
+                  </a:schemeClr>
+                </a:solidFill>
+                <a:latin typeface="TH SarabunPSK" panose="020B0500040200020003" pitchFamily="34" charset="-34"/>
+                <a:ea typeface="Open Sans Light" panose="020B0306030504020204" pitchFamily="34" charset="0"/>
+                <a:cs typeface="TH SarabunPSK" panose="020B0500040200020003" pitchFamily="34" charset="-34"/>
+              </a:rPr>
+              <a:t>av.zarahemlabranch.org</a:t>
+            </a:r>
+            <a:r>
+              <a:rPr lang="en-US" sz="4400" b="1" spc="100" dirty="0">
+                <a:solidFill>
+                  <a:schemeClr val="bg1">
+                    <a:lumMod val="95000"/>
+                  </a:schemeClr>
+                </a:solidFill>
+                <a:latin typeface="TH SarabunPSK" panose="020B0500040200020003" pitchFamily="34" charset="-34"/>
+                <a:ea typeface="Open Sans Light" panose="020B0306030504020204" pitchFamily="34" charset="0"/>
+                <a:cs typeface="TH SarabunPSK" panose="020B0500040200020003" pitchFamily="34" charset="-34"/>
+              </a:rPr>
+              <a:t>/choppy</a:t>
+            </a:r>
+          </a:p>
+        </p:txBody>
+      </p:sp>
+      <p:cxnSp>
+        <p:nvCxnSpPr>
+          <p:cNvPr id="12" name="Straight Connector 11">
+            <a:extLst>
+              <a:ext uri="{FF2B5EF4-FFF2-40B4-BE49-F238E27FC236}">
+                <a16:creationId xmlns:a16="http://schemas.microsoft.com/office/drawing/2014/main" id="{36EB91BF-9E6C-684D-869D-64AFC067B5C1}"/>
+              </a:ext>
+            </a:extLst>
+          </p:cNvPr>
+          <p:cNvCxnSpPr>
+            <a:cxnSpLocks/>
+          </p:cNvCxnSpPr>
+          <p:nvPr/>
+        </p:nvCxnSpPr>
+        <p:spPr>
+          <a:xfrm>
+            <a:off x="6754905" y="1264025"/>
+            <a:ext cx="0" cy="5446059"/>
+          </a:xfrm>
+          <a:prstGeom prst="line">
+            <a:avLst/>
+          </a:prstGeom>
+        </p:spPr>
+        <p:style>
+          <a:lnRef idx="1">
+            <a:schemeClr val="accent1"/>
+          </a:lnRef>
+          <a:fillRef idx="0">
+            <a:schemeClr val="accent1"/>
+          </a:fillRef>
+          <a:effectRef idx="0">
+            <a:schemeClr val="accent1"/>
+          </a:effectRef>
+          <a:fontRef idx="minor">
+            <a:schemeClr val="tx1"/>
+          </a:fontRef>
+        </p:style>
+      </p:cxnSp>
+      <p:cxnSp>
+        <p:nvCxnSpPr>
+          <p:cNvPr id="14" name="Straight Connector 13">
+            <a:extLst>
+              <a:ext uri="{FF2B5EF4-FFF2-40B4-BE49-F238E27FC236}">
+                <a16:creationId xmlns:a16="http://schemas.microsoft.com/office/drawing/2014/main" id="{D580A6AD-79CF-C84A-A575-8D5877DD1AA9}"/>
+              </a:ext>
+            </a:extLst>
+          </p:cNvPr>
+          <p:cNvCxnSpPr>
+            <a:cxnSpLocks/>
+          </p:cNvCxnSpPr>
+          <p:nvPr/>
+        </p:nvCxnSpPr>
+        <p:spPr>
+          <a:xfrm>
+            <a:off x="10702243" y="1712259"/>
+            <a:ext cx="0" cy="5446059"/>
+          </a:xfrm>
+          <a:prstGeom prst="line">
+            <a:avLst/>
+          </a:prstGeom>
+        </p:spPr>
+        <p:style>
+          <a:lnRef idx="1">
+            <a:schemeClr val="accent1"/>
+          </a:lnRef>
+          <a:fillRef idx="0">
+            <a:schemeClr val="accent1"/>
+          </a:fillRef>
+          <a:effectRef idx="0">
+            <a:schemeClr val="accent1"/>
+          </a:effectRef>
+          <a:fontRef idx="minor">
+            <a:schemeClr val="tx1"/>
+          </a:fontRef>
+        </p:style>
+      </p:cxnSp>
+    </p:spTree>
+    <p:extLst>
+      <p:ext uri="{BB962C8B-B14F-4D97-AF65-F5344CB8AC3E}">
+        <p14:creationId xmlns:p14="http://schemas.microsoft.com/office/powerpoint/2010/main" val="824933669"/>
+      </p:ext>
+    </p:extLst>
+  </p:cSld>
+  <p:clrMapOvr>
+    <a:masterClrMapping/>
+  </p:clrMapOvr>
+</p:sld>
+</file>
+
+<file path=ppt/slides/slide4.xml><?xml version="1.0" encoding="utf-8"?>
+<p:sld xmlns:a="http://schemas.openxmlformats.org/drawingml/2006/main" xmlns:r="http://schemas.openxmlformats.org/officeDocument/2006/relationships" xmlns:p="http://schemas.openxmlformats.org/presentationml/2006/main">
+  <p:cSld>
+    <p:spTree>
+      <p:nvGrpSpPr>
+        <p:cNvPr id="1" name=""/>
+        <p:cNvGrpSpPr/>
+        <p:nvPr/>
+      </p:nvGrpSpPr>
+      <p:grpSpPr>
+        <a:xfrm>
+          <a:off x="0" y="0"/>
+          <a:ext cx="0" cy="0"/>
+          <a:chOff x="0" y="0"/>
+          <a:chExt cx="0" cy="0"/>
+        </a:xfrm>
+      </p:grpSpPr>
+      <p:pic>
+        <p:nvPicPr>
+          <p:cNvPr id="10" name="Picture 9">
+            <a:extLst>
+              <a:ext uri="{FF2B5EF4-FFF2-40B4-BE49-F238E27FC236}">
+                <a16:creationId xmlns:a16="http://schemas.microsoft.com/office/drawing/2014/main" id="{A025FB35-6D21-DF4C-9708-6EF82A040325}"/>
+              </a:ext>
+            </a:extLst>
+          </p:cNvPr>
+          <p:cNvPicPr>
+            <a:picLocks noChangeAspect="1"/>
+          </p:cNvPicPr>
+          <p:nvPr/>
+        </p:nvPicPr>
+        <p:blipFill rotWithShape="1">
+          <a:blip r:embed="rId2">
+            <a:extLst>
+              <a:ext uri="{28A0092B-C50C-407E-A947-70E740481C1C}">
+                <a14:useLocalDpi xmlns:a14="http://schemas.microsoft.com/office/drawing/2010/main" val="0"/>
+              </a:ext>
+            </a:extLst>
+          </a:blip>
+          <a:srcRect t="1045" r="988" b="15331"/>
+          <a:stretch/>
+        </p:blipFill>
+        <p:spPr>
+          <a:xfrm>
+            <a:off x="0" y="0"/>
+            <a:ext cx="12192000" cy="6858000"/>
+          </a:xfrm>
+          <a:prstGeom prst="rect">
+            <a:avLst/>
+          </a:prstGeom>
+        </p:spPr>
+      </p:pic>
+      <p:sp>
+        <p:nvSpPr>
+          <p:cNvPr id="11" name="Rectangle 10">
+            <a:extLst>
+              <a:ext uri="{FF2B5EF4-FFF2-40B4-BE49-F238E27FC236}">
+                <a16:creationId xmlns:a16="http://schemas.microsoft.com/office/drawing/2014/main" id="{60CDDD3F-4D58-4D4A-9B29-AA987CCB14F8}"/>
+              </a:ext>
+            </a:extLst>
+          </p:cNvPr>
+          <p:cNvSpPr/>
+          <p:nvPr/>
+        </p:nvSpPr>
+        <p:spPr>
+          <a:xfrm>
+            <a:off x="0" y="0"/>
+            <a:ext cx="12192000" cy="6858000"/>
+          </a:xfrm>
+          <a:prstGeom prst="rect">
+            <a:avLst/>
+          </a:prstGeom>
+          <a:solidFill>
+            <a:srgbClr val="000000">
+              <a:alpha val="58039"/>
+            </a:srgbClr>
           </a:solidFill>
           <a:ln>
             <a:noFill/>
@@ -3511,10 +4890,10 @@
       </p:sp>
       <p:sp>
         <p:nvSpPr>
-          <p:cNvPr id="6" name="TextBox 5">
-            <a:extLst>
-              <a:ext uri="{FF2B5EF4-FFF2-40B4-BE49-F238E27FC236}">
-                <a16:creationId xmlns:a16="http://schemas.microsoft.com/office/drawing/2014/main" id="{08992873-5B2F-44D3-88A0-F82ACED4C6D8}"/>
+          <p:cNvPr id="12" name="TextBox 11">
+            <a:extLst>
+              <a:ext uri="{FF2B5EF4-FFF2-40B4-BE49-F238E27FC236}">
+                <a16:creationId xmlns:a16="http://schemas.microsoft.com/office/drawing/2014/main" id="{F239E608-92AA-A54C-8870-C8409CEC5FB0}"/>
               </a:ext>
             </a:extLst>
           </p:cNvPr>
@@ -3523,8 +4902,8 @@
         </p:nvSpPr>
         <p:spPr>
           <a:xfrm>
-            <a:off x="254643" y="4370868"/>
-            <a:ext cx="4606724" cy="369332"/>
+            <a:off x="3894766" y="2381569"/>
+            <a:ext cx="4402468" cy="830997"/>
           </a:xfrm>
           <a:prstGeom prst="rect">
             <a:avLst/>
@@ -3532,29 +4911,80 @@
           <a:noFill/>
         </p:spPr>
         <p:txBody>
-          <a:bodyPr wrap="square" rtlCol="0">
+          <a:bodyPr wrap="square" rtlCol="0" anchor="ctr">
             <a:spAutoFit/>
           </a:bodyPr>
           <a:lstStyle/>
           <a:p>
-            <a:r>
-              <a:rPr lang="en-US" dirty="0">
+            <a:pPr algn="ctr"/>
+            <a:r>
+              <a:rPr lang="en-US" sz="4800" dirty="0">
                 <a:solidFill>
-                  <a:schemeClr val="bg1"/>
+                  <a:schemeClr val="bg1">
+                    <a:lumMod val="95000"/>
+                  </a:schemeClr>
                 </a:solidFill>
-                <a:latin typeface="Copperplate Gothic Light" panose="020E0507020206020404" pitchFamily="34" charset="0"/>
+                <a:effectLst>
+                  <a:outerShdw blurRad="50800" dist="38100" dir="2700000" algn="tl" rotWithShape="0">
+                    <a:prstClr val="black">
+                      <a:alpha val="40000"/>
+                    </a:prstClr>
+                  </a:outerShdw>
+                </a:effectLst>
+                <a:latin typeface="Pristina" panose="03060402040406080204" pitchFamily="66" charset="77"/>
               </a:rPr>
-              <a:t>Outreach Restoration Branch</a:t>
-            </a:r>
-          </a:p>
-        </p:txBody>
-      </p:sp>
-      <p:sp>
-        <p:nvSpPr>
-          <p:cNvPr id="7" name="TextBox 6">
-            <a:extLst>
-              <a:ext uri="{FF2B5EF4-FFF2-40B4-BE49-F238E27FC236}">
-                <a16:creationId xmlns:a16="http://schemas.microsoft.com/office/drawing/2014/main" id="{BFA5E361-6FDA-4179-8A6E-61EB11E136CE}"/>
+              <a:t>Zarahemla Branch</a:t>
+            </a:r>
+          </a:p>
+        </p:txBody>
+      </p:sp>
+      <p:cxnSp>
+        <p:nvCxnSpPr>
+          <p:cNvPr id="14" name="Straight Connector 13">
+            <a:extLst>
+              <a:ext uri="{FF2B5EF4-FFF2-40B4-BE49-F238E27FC236}">
+                <a16:creationId xmlns:a16="http://schemas.microsoft.com/office/drawing/2014/main" id="{0185217F-EE30-4643-A960-137F0696F55F}"/>
+              </a:ext>
+            </a:extLst>
+          </p:cNvPr>
+          <p:cNvCxnSpPr/>
+          <p:nvPr/>
+        </p:nvCxnSpPr>
+        <p:spPr>
+          <a:xfrm>
+            <a:off x="4242148" y="3144033"/>
+            <a:ext cx="3707704" cy="0"/>
+          </a:xfrm>
+          <a:prstGeom prst="line">
+            <a:avLst/>
+          </a:prstGeom>
+          <a:ln w="12700">
+            <a:solidFill>
+              <a:schemeClr val="bg1"/>
+            </a:solidFill>
+          </a:ln>
+        </p:spPr>
+        <p:style>
+          <a:lnRef idx="1">
+            <a:schemeClr val="accent1"/>
+          </a:lnRef>
+          <a:fillRef idx="0">
+            <a:schemeClr val="accent1"/>
+          </a:fillRef>
+          <a:effectRef idx="0">
+            <a:schemeClr val="accent1"/>
+          </a:effectRef>
+          <a:fontRef idx="minor">
+            <a:schemeClr val="tx1"/>
+          </a:fontRef>
+        </p:style>
+      </p:cxnSp>
+      <p:sp>
+        <p:nvSpPr>
+          <p:cNvPr id="15" name="TextBox 14">
+            <a:extLst>
+              <a:ext uri="{FF2B5EF4-FFF2-40B4-BE49-F238E27FC236}">
+                <a16:creationId xmlns:a16="http://schemas.microsoft.com/office/drawing/2014/main" id="{ACD13FE9-005F-9F44-9595-229D72EE8596}"/>
               </a:ext>
             </a:extLst>
           </p:cNvPr>
@@ -3563,8 +4993,8 @@
         </p:nvSpPr>
         <p:spPr>
           <a:xfrm>
-            <a:off x="295153" y="5031996"/>
-            <a:ext cx="8252497" cy="646331"/>
+            <a:off x="3567418" y="3288972"/>
+            <a:ext cx="5057169" cy="523220"/>
           </a:xfrm>
           <a:prstGeom prst="rect">
             <a:avLst/>
@@ -3572,31 +5002,104 @@
           <a:noFill/>
         </p:spPr>
         <p:txBody>
-          <a:bodyPr wrap="square" rtlCol="0">
+          <a:bodyPr wrap="square" rtlCol="0" anchor="ctr">
             <a:spAutoFit/>
           </a:bodyPr>
           <a:lstStyle/>
           <a:p>
-            <a:r>
-              <a:rPr lang="en-US" sz="3600" b="1" dirty="0">
+            <a:pPr algn="ctr"/>
+            <a:r>
+              <a:rPr lang="en-US" sz="2800" dirty="0">
                 <a:solidFill>
-                  <a:schemeClr val="bg1"/>
+                  <a:schemeClr val="bg1">
+                    <a:lumMod val="95000"/>
+                  </a:schemeClr>
                 </a:solidFill>
-                <a:latin typeface="Open Sans" panose="020B0606030504020204" pitchFamily="34" charset="0"/>
-                <a:ea typeface="Open Sans" panose="020B0606030504020204" pitchFamily="34" charset="0"/>
-                <a:cs typeface="Open Sans" panose="020B0606030504020204" pitchFamily="34" charset="0"/>
+                <a:effectLst>
+                  <a:outerShdw blurRad="50800" dist="38100" dir="2700000" algn="tl" rotWithShape="0">
+                    <a:prstClr val="black">
+                      <a:alpha val="40000"/>
+                    </a:prstClr>
+                  </a:outerShdw>
+                </a:effectLst>
+                <a:latin typeface="Copperplate Light" panose="02000604030000020004" pitchFamily="2" charset="77"/>
               </a:rPr>
-              <a:t>Elder Larry Hodges</a:t>
-            </a:r>
-          </a:p>
-        </p:txBody>
-      </p:sp>
-      <p:sp>
-        <p:nvSpPr>
-          <p:cNvPr id="9" name="Rectangle 8">
-            <a:extLst>
-              <a:ext uri="{FF2B5EF4-FFF2-40B4-BE49-F238E27FC236}">
-                <a16:creationId xmlns:a16="http://schemas.microsoft.com/office/drawing/2014/main" id="{B643CC3C-6487-436B-8FCC-0763AE846992}"/>
+              <a:t>Announcement</a:t>
+            </a:r>
+          </a:p>
+        </p:txBody>
+      </p:sp>
+    </p:spTree>
+    <p:extLst>
+      <p:ext uri="{BB962C8B-B14F-4D97-AF65-F5344CB8AC3E}">
+        <p14:creationId xmlns:p14="http://schemas.microsoft.com/office/powerpoint/2010/main" val="2160945606"/>
+      </p:ext>
+    </p:extLst>
+  </p:cSld>
+  <p:clrMapOvr>
+    <a:masterClrMapping/>
+  </p:clrMapOvr>
+</p:sld>
+</file>
+
+<file path=ppt/slides/slide5.xml><?xml version="1.0" encoding="utf-8"?>
+<p:sld xmlns:a="http://schemas.openxmlformats.org/drawingml/2006/main" xmlns:r="http://schemas.openxmlformats.org/officeDocument/2006/relationships" xmlns:p="http://schemas.openxmlformats.org/presentationml/2006/main">
+  <p:cSld>
+    <p:spTree>
+      <p:nvGrpSpPr>
+        <p:cNvPr id="1" name=""/>
+        <p:cNvGrpSpPr/>
+        <p:nvPr/>
+      </p:nvGrpSpPr>
+      <p:grpSpPr>
+        <a:xfrm>
+          <a:off x="0" y="0"/>
+          <a:ext cx="0" cy="0"/>
+          <a:chOff x="0" y="0"/>
+          <a:chExt cx="0" cy="0"/>
+        </a:xfrm>
+      </p:grpSpPr>
+      <p:pic>
+        <p:nvPicPr>
+          <p:cNvPr id="10" name="Picture 9">
+            <a:extLst>
+              <a:ext uri="{FF2B5EF4-FFF2-40B4-BE49-F238E27FC236}">
+                <a16:creationId xmlns:a16="http://schemas.microsoft.com/office/drawing/2014/main" id="{A025FB35-6D21-DF4C-9708-6EF82A040325}"/>
+              </a:ext>
+            </a:extLst>
+          </p:cNvPr>
+          <p:cNvPicPr>
+            <a:picLocks noChangeAspect="1"/>
+          </p:cNvPicPr>
+          <p:nvPr/>
+        </p:nvPicPr>
+        <p:blipFill rotWithShape="1">
+          <a:blip r:embed="rId2">
+            <a:extLst>
+              <a:ext uri="{28A0092B-C50C-407E-A947-70E740481C1C}">
+                <a14:useLocalDpi xmlns:a14="http://schemas.microsoft.com/office/drawing/2010/main" val="0"/>
+              </a:ext>
+            </a:extLst>
+          </a:blip>
+          <a:srcRect t="1045" r="988" b="15331"/>
+          <a:stretch/>
+        </p:blipFill>
+        <p:spPr>
+          <a:xfrm>
+            <a:off x="0" y="0"/>
+            <a:ext cx="12192000" cy="6858000"/>
+          </a:xfrm>
+          <a:prstGeom prst="rect">
+            <a:avLst/>
+          </a:prstGeom>
+        </p:spPr>
+      </p:pic>
+      <p:sp>
+        <p:nvSpPr>
+          <p:cNvPr id="11" name="Rectangle 10">
+            <a:extLst>
+              <a:ext uri="{FF2B5EF4-FFF2-40B4-BE49-F238E27FC236}">
+                <a16:creationId xmlns:a16="http://schemas.microsoft.com/office/drawing/2014/main" id="{60CDDD3F-4D58-4D4A-9B29-AA987CCB14F8}"/>
               </a:ext>
             </a:extLst>
           </p:cNvPr>
@@ -3605,28 +5108,20 @@
         </p:nvSpPr>
         <p:spPr>
           <a:xfrm>
-            <a:off x="603811" y="5718228"/>
-            <a:ext cx="4986761" cy="497375"/>
+            <a:off x="0" y="0"/>
+            <a:ext cx="12192000" cy="6858000"/>
           </a:xfrm>
           <a:prstGeom prst="rect">
             <a:avLst/>
           </a:prstGeom>
           <a:solidFill>
-            <a:schemeClr val="tx1">
-              <a:lumMod val="85000"/>
-              <a:lumOff val="15000"/>
-            </a:schemeClr>
+            <a:srgbClr val="000000">
+              <a:alpha val="58039"/>
+            </a:srgbClr>
           </a:solidFill>
           <a:ln>
             <a:noFill/>
           </a:ln>
-          <a:effectLst>
-            <a:outerShdw blurRad="50800" dist="38100" dir="8100000" algn="tr" rotWithShape="0">
-              <a:prstClr val="black">
-                <a:alpha val="40000"/>
-              </a:prstClr>
-            </a:outerShdw>
-          </a:effectLst>
         </p:spPr>
         <p:style>
           <a:lnRef idx="2">
@@ -3648,17 +5143,17 @@
           <a:bodyPr rtlCol="0" anchor="ctr"/>
           <a:lstStyle/>
           <a:p>
-            <a:pPr algn="r"/>
-            <a:endParaRPr lang="en-US" sz="2400" dirty="0"/>
-          </a:p>
-        </p:txBody>
-      </p:sp>
-      <p:sp>
-        <p:nvSpPr>
-          <p:cNvPr id="8" name="TextBox 7">
-            <a:extLst>
-              <a:ext uri="{FF2B5EF4-FFF2-40B4-BE49-F238E27FC236}">
-                <a16:creationId xmlns:a16="http://schemas.microsoft.com/office/drawing/2014/main" id="{C5DC6BE6-805C-40DE-BECA-7BA0EBF0ADF1}"/>
+            <a:pPr algn="ctr"/>
+            <a:endParaRPr lang="en-US"/>
+          </a:p>
+        </p:txBody>
+      </p:sp>
+      <p:sp>
+        <p:nvSpPr>
+          <p:cNvPr id="12" name="TextBox 11">
+            <a:extLst>
+              <a:ext uri="{FF2B5EF4-FFF2-40B4-BE49-F238E27FC236}">
+                <a16:creationId xmlns:a16="http://schemas.microsoft.com/office/drawing/2014/main" id="{F239E608-92AA-A54C-8870-C8409CEC5FB0}"/>
               </a:ext>
             </a:extLst>
           </p:cNvPr>
@@ -3667,8 +5162,8 @@
         </p:nvSpPr>
         <p:spPr>
           <a:xfrm>
-            <a:off x="707986" y="5784454"/>
-            <a:ext cx="4986761" cy="400110"/>
+            <a:off x="3894766" y="2665346"/>
+            <a:ext cx="4402468" cy="830998"/>
           </a:xfrm>
           <a:prstGeom prst="rect">
             <a:avLst/>
@@ -3676,29 +5171,1706 @@
           <a:noFill/>
         </p:spPr>
         <p:txBody>
+          <a:bodyPr wrap="square" rtlCol="0" anchor="ctr">
+            <a:spAutoFit/>
+          </a:bodyPr>
+          <a:lstStyle/>
+          <a:p>
+            <a:pPr algn="ctr"/>
+            <a:r>
+              <a:rPr lang="en-US" sz="4800" dirty="0">
+                <a:solidFill>
+                  <a:schemeClr val="bg1">
+                    <a:lumMod val="95000"/>
+                  </a:schemeClr>
+                </a:solidFill>
+                <a:effectLst>
+                  <a:outerShdw blurRad="50800" dist="38100" dir="2700000" algn="tl" rotWithShape="0">
+                    <a:prstClr val="black">
+                      <a:alpha val="40000"/>
+                    </a:prstClr>
+                  </a:outerShdw>
+                </a:effectLst>
+                <a:latin typeface="Pristina" panose="03060402040406080204" pitchFamily="66" charset="77"/>
+              </a:rPr>
+              <a:t>Zarahemla Branch</a:t>
+            </a:r>
+          </a:p>
+        </p:txBody>
+      </p:sp>
+      <p:cxnSp>
+        <p:nvCxnSpPr>
+          <p:cNvPr id="14" name="Straight Connector 13">
+            <a:extLst>
+              <a:ext uri="{FF2B5EF4-FFF2-40B4-BE49-F238E27FC236}">
+                <a16:creationId xmlns:a16="http://schemas.microsoft.com/office/drawing/2014/main" id="{0185217F-EE30-4643-A960-137F0696F55F}"/>
+              </a:ext>
+            </a:extLst>
+          </p:cNvPr>
+          <p:cNvCxnSpPr/>
+          <p:nvPr/>
+        </p:nvCxnSpPr>
+        <p:spPr>
+          <a:xfrm>
+            <a:off x="4242148" y="3427813"/>
+            <a:ext cx="3707704" cy="0"/>
+          </a:xfrm>
+          <a:prstGeom prst="line">
+            <a:avLst/>
+          </a:prstGeom>
+          <a:ln w="12700">
+            <a:solidFill>
+              <a:schemeClr val="bg1"/>
+            </a:solidFill>
+          </a:ln>
+        </p:spPr>
+        <p:style>
+          <a:lnRef idx="1">
+            <a:schemeClr val="accent1"/>
+          </a:lnRef>
+          <a:fillRef idx="0">
+            <a:schemeClr val="accent1"/>
+          </a:fillRef>
+          <a:effectRef idx="0">
+            <a:schemeClr val="accent1"/>
+          </a:effectRef>
+          <a:fontRef idx="minor">
+            <a:schemeClr val="tx1"/>
+          </a:fontRef>
+        </p:style>
+      </p:cxnSp>
+      <p:sp>
+        <p:nvSpPr>
+          <p:cNvPr id="15" name="TextBox 14">
+            <a:extLst>
+              <a:ext uri="{FF2B5EF4-FFF2-40B4-BE49-F238E27FC236}">
+                <a16:creationId xmlns:a16="http://schemas.microsoft.com/office/drawing/2014/main" id="{ACD13FE9-005F-9F44-9595-229D72EE8596}"/>
+              </a:ext>
+            </a:extLst>
+          </p:cNvPr>
+          <p:cNvSpPr txBox="1"/>
+          <p:nvPr/>
+        </p:nvSpPr>
+        <p:spPr>
+          <a:xfrm>
+            <a:off x="3567417" y="3433911"/>
+            <a:ext cx="5057169" cy="523221"/>
+          </a:xfrm>
+          <a:prstGeom prst="rect">
+            <a:avLst/>
+          </a:prstGeom>
+          <a:noFill/>
+        </p:spPr>
+        <p:txBody>
+          <a:bodyPr wrap="square" rtlCol="0" anchor="ctr">
+            <a:spAutoFit/>
+          </a:bodyPr>
+          <a:lstStyle/>
+          <a:p>
+            <a:pPr algn="ctr"/>
+            <a:r>
+              <a:rPr lang="en-US" sz="2800" dirty="0">
+                <a:solidFill>
+                  <a:schemeClr val="bg1">
+                    <a:lumMod val="95000"/>
+                  </a:schemeClr>
+                </a:solidFill>
+                <a:effectLst>
+                  <a:outerShdw blurRad="50800" dist="38100" dir="2700000" algn="tl" rotWithShape="0">
+                    <a:prstClr val="black">
+                      <a:alpha val="40000"/>
+                    </a:prstClr>
+                  </a:outerShdw>
+                </a:effectLst>
+                <a:latin typeface="Copperplate Light" panose="02000604030000020004" pitchFamily="2" charset="77"/>
+              </a:rPr>
+              <a:t>Announcement</a:t>
+            </a:r>
+          </a:p>
+        </p:txBody>
+      </p:sp>
+    </p:spTree>
+    <p:extLst>
+      <p:ext uri="{BB962C8B-B14F-4D97-AF65-F5344CB8AC3E}">
+        <p14:creationId xmlns:p14="http://schemas.microsoft.com/office/powerpoint/2010/main" val="2544373296"/>
+      </p:ext>
+    </p:extLst>
+  </p:cSld>
+  <p:clrMapOvr>
+    <a:masterClrMapping/>
+  </p:clrMapOvr>
+  <p:timing>
+    <p:tnLst>
+      <p:par>
+        <p:cTn id="1" dur="indefinite" restart="never" nodeType="tmRoot">
+          <p:childTnLst>
+            <p:seq concurrent="1" nextAc="seek">
+              <p:cTn id="2" dur="indefinite" nodeType="mainSeq">
+                <p:childTnLst>
+                  <p:par>
+                    <p:cTn id="3" fill="hold">
+                      <p:stCondLst>
+                        <p:cond delay="indefinite"/>
+                        <p:cond evt="onBegin" delay="0">
+                          <p:tn val="2"/>
+                        </p:cond>
+                      </p:stCondLst>
+                      <p:childTnLst>
+                        <p:par>
+                          <p:cTn id="4" fill="hold">
+                            <p:stCondLst>
+                              <p:cond delay="0"/>
+                            </p:stCondLst>
+                            <p:childTnLst>
+                              <p:par>
+                                <p:cTn id="5" presetID="16" presetClass="entr" presetSubtype="37" fill="hold" nodeType="afterEffect">
+                                  <p:stCondLst>
+                                    <p:cond delay="1250"/>
+                                  </p:stCondLst>
+                                  <p:childTnLst>
+                                    <p:set>
+                                      <p:cBhvr>
+                                        <p:cTn id="6" dur="1" fill="hold">
+                                          <p:stCondLst>
+                                            <p:cond delay="0"/>
+                                          </p:stCondLst>
+                                        </p:cTn>
+                                        <p:tgtEl>
+                                          <p:spTgt spid="14"/>
+                                        </p:tgtEl>
+                                        <p:attrNameLst>
+                                          <p:attrName>style.visibility</p:attrName>
+                                        </p:attrNameLst>
+                                      </p:cBhvr>
+                                      <p:to>
+                                        <p:strVal val="visible"/>
+                                      </p:to>
+                                    </p:set>
+                                    <p:animEffect transition="in" filter="barn(outVertical)">
+                                      <p:cBhvr>
+                                        <p:cTn id="7" dur="500"/>
+                                        <p:tgtEl>
+                                          <p:spTgt spid="14"/>
+                                        </p:tgtEl>
+                                      </p:cBhvr>
+                                    </p:animEffect>
+                                  </p:childTnLst>
+                                </p:cTn>
+                              </p:par>
+                            </p:childTnLst>
+                          </p:cTn>
+                        </p:par>
+                        <p:par>
+                          <p:cTn id="8" fill="hold">
+                            <p:stCondLst>
+                              <p:cond delay="1750"/>
+                            </p:stCondLst>
+                            <p:childTnLst>
+                              <p:par>
+                                <p:cTn id="9" presetID="22" presetClass="entr" presetSubtype="1" fill="hold" grpId="0" nodeType="afterEffect">
+                                  <p:stCondLst>
+                                    <p:cond delay="0"/>
+                                  </p:stCondLst>
+                                  <p:childTnLst>
+                                    <p:set>
+                                      <p:cBhvr>
+                                        <p:cTn id="10" dur="1" fill="hold">
+                                          <p:stCondLst>
+                                            <p:cond delay="0"/>
+                                          </p:stCondLst>
+                                        </p:cTn>
+                                        <p:tgtEl>
+                                          <p:spTgt spid="15"/>
+                                        </p:tgtEl>
+                                        <p:attrNameLst>
+                                          <p:attrName>style.visibility</p:attrName>
+                                        </p:attrNameLst>
+                                      </p:cBhvr>
+                                      <p:to>
+                                        <p:strVal val="visible"/>
+                                      </p:to>
+                                    </p:set>
+                                    <p:animEffect transition="in" filter="wipe(up)">
+                                      <p:cBhvr>
+                                        <p:cTn id="11" dur="750"/>
+                                        <p:tgtEl>
+                                          <p:spTgt spid="15"/>
+                                        </p:tgtEl>
+                                      </p:cBhvr>
+                                    </p:animEffect>
+                                  </p:childTnLst>
+                                </p:cTn>
+                              </p:par>
+                            </p:childTnLst>
+                          </p:cTn>
+                        </p:par>
+                      </p:childTnLst>
+                    </p:cTn>
+                  </p:par>
+                </p:childTnLst>
+              </p:cTn>
+              <p:prevCondLst>
+                <p:cond evt="onPrev" delay="0">
+                  <p:tgtEl>
+                    <p:sldTgt/>
+                  </p:tgtEl>
+                </p:cond>
+              </p:prevCondLst>
+              <p:nextCondLst>
+                <p:cond evt="onNext" delay="0">
+                  <p:tgtEl>
+                    <p:sldTgt/>
+                  </p:tgtEl>
+                </p:cond>
+              </p:nextCondLst>
+            </p:seq>
+          </p:childTnLst>
+        </p:cTn>
+      </p:par>
+    </p:tnLst>
+    <p:bldLst>
+      <p:bldP spid="15" grpId="0"/>
+    </p:bldLst>
+  </p:timing>
+</p:sld>
+</file>
+
+<file path=ppt/slides/slide6.xml><?xml version="1.0" encoding="utf-8"?>
+<p:sld xmlns:a="http://schemas.openxmlformats.org/drawingml/2006/main" xmlns:r="http://schemas.openxmlformats.org/officeDocument/2006/relationships" xmlns:p="http://schemas.openxmlformats.org/presentationml/2006/main">
+  <p:cSld>
+    <p:spTree>
+      <p:nvGrpSpPr>
+        <p:cNvPr id="1" name=""/>
+        <p:cNvGrpSpPr/>
+        <p:nvPr/>
+      </p:nvGrpSpPr>
+      <p:grpSpPr>
+        <a:xfrm>
+          <a:off x="0" y="0"/>
+          <a:ext cx="0" cy="0"/>
+          <a:chOff x="0" y="0"/>
+          <a:chExt cx="0" cy="0"/>
+        </a:xfrm>
+      </p:grpSpPr>
+      <p:pic>
+        <p:nvPicPr>
+          <p:cNvPr id="10" name="Picture 9">
+            <a:extLst>
+              <a:ext uri="{FF2B5EF4-FFF2-40B4-BE49-F238E27FC236}">
+                <a16:creationId xmlns:a16="http://schemas.microsoft.com/office/drawing/2014/main" id="{A025FB35-6D21-DF4C-9708-6EF82A040325}"/>
+              </a:ext>
+            </a:extLst>
+          </p:cNvPr>
+          <p:cNvPicPr>
+            <a:picLocks noChangeAspect="1"/>
+          </p:cNvPicPr>
+          <p:nvPr/>
+        </p:nvPicPr>
+        <p:blipFill rotWithShape="1">
+          <a:blip r:embed="rId2">
+            <a:extLst>
+              <a:ext uri="{28A0092B-C50C-407E-A947-70E740481C1C}">
+                <a14:useLocalDpi xmlns:a14="http://schemas.microsoft.com/office/drawing/2010/main" val="0"/>
+              </a:ext>
+            </a:extLst>
+          </a:blip>
+          <a:srcRect t="1045" r="988" b="15331"/>
+          <a:stretch/>
+        </p:blipFill>
+        <p:spPr>
+          <a:xfrm>
+            <a:off x="0" y="0"/>
+            <a:ext cx="12192000" cy="6858000"/>
+          </a:xfrm>
+          <a:prstGeom prst="rect">
+            <a:avLst/>
+          </a:prstGeom>
+        </p:spPr>
+      </p:pic>
+      <p:sp>
+        <p:nvSpPr>
+          <p:cNvPr id="11" name="Rectangle 10">
+            <a:extLst>
+              <a:ext uri="{FF2B5EF4-FFF2-40B4-BE49-F238E27FC236}">
+                <a16:creationId xmlns:a16="http://schemas.microsoft.com/office/drawing/2014/main" id="{60CDDD3F-4D58-4D4A-9B29-AA987CCB14F8}"/>
+              </a:ext>
+            </a:extLst>
+          </p:cNvPr>
+          <p:cNvSpPr/>
+          <p:nvPr/>
+        </p:nvSpPr>
+        <p:spPr>
+          <a:xfrm>
+            <a:off x="0" y="0"/>
+            <a:ext cx="12192000" cy="6858000"/>
+          </a:xfrm>
+          <a:prstGeom prst="rect">
+            <a:avLst/>
+          </a:prstGeom>
+          <a:solidFill>
+            <a:srgbClr val="000000">
+              <a:alpha val="58039"/>
+            </a:srgbClr>
+          </a:solidFill>
+          <a:ln>
+            <a:noFill/>
+          </a:ln>
+        </p:spPr>
+        <p:style>
+          <a:lnRef idx="2">
+            <a:schemeClr val="accent1">
+              <a:shade val="50000"/>
+            </a:schemeClr>
+          </a:lnRef>
+          <a:fillRef idx="1">
+            <a:schemeClr val="accent1"/>
+          </a:fillRef>
+          <a:effectRef idx="0">
+            <a:schemeClr val="accent1"/>
+          </a:effectRef>
+          <a:fontRef idx="minor">
+            <a:schemeClr val="lt1"/>
+          </a:fontRef>
+        </p:style>
+        <p:txBody>
+          <a:bodyPr rtlCol="0" anchor="ctr"/>
+          <a:lstStyle/>
+          <a:p>
+            <a:pPr algn="ctr"/>
+            <a:endParaRPr lang="en-US"/>
+          </a:p>
+        </p:txBody>
+      </p:sp>
+      <p:sp>
+        <p:nvSpPr>
+          <p:cNvPr id="12" name="TextBox 11">
+            <a:extLst>
+              <a:ext uri="{FF2B5EF4-FFF2-40B4-BE49-F238E27FC236}">
+                <a16:creationId xmlns:a16="http://schemas.microsoft.com/office/drawing/2014/main" id="{F239E608-92AA-A54C-8870-C8409CEC5FB0}"/>
+              </a:ext>
+            </a:extLst>
+          </p:cNvPr>
+          <p:cNvSpPr txBox="1"/>
+          <p:nvPr/>
+        </p:nvSpPr>
+        <p:spPr>
+          <a:xfrm>
+            <a:off x="3894766" y="2665346"/>
+            <a:ext cx="4402468" cy="830998"/>
+          </a:xfrm>
+          <a:prstGeom prst="rect">
+            <a:avLst/>
+          </a:prstGeom>
+          <a:noFill/>
+        </p:spPr>
+        <p:txBody>
+          <a:bodyPr wrap="square" rtlCol="0" anchor="ctr">
+            <a:spAutoFit/>
+          </a:bodyPr>
+          <a:lstStyle/>
+          <a:p>
+            <a:pPr algn="ctr"/>
+            <a:r>
+              <a:rPr lang="en-US" sz="4800" dirty="0">
+                <a:solidFill>
+                  <a:schemeClr val="bg1">
+                    <a:lumMod val="95000"/>
+                  </a:schemeClr>
+                </a:solidFill>
+                <a:effectLst>
+                  <a:outerShdw blurRad="50800" dist="38100" dir="2700000" algn="tl" rotWithShape="0">
+                    <a:prstClr val="black">
+                      <a:alpha val="40000"/>
+                    </a:prstClr>
+                  </a:outerShdw>
+                </a:effectLst>
+                <a:latin typeface="Pristina" panose="03060402040406080204" pitchFamily="66" charset="77"/>
+              </a:rPr>
+              <a:t>Zarahemla Branch</a:t>
+            </a:r>
+          </a:p>
+        </p:txBody>
+      </p:sp>
+      <p:cxnSp>
+        <p:nvCxnSpPr>
+          <p:cNvPr id="14" name="Straight Connector 13">
+            <a:extLst>
+              <a:ext uri="{FF2B5EF4-FFF2-40B4-BE49-F238E27FC236}">
+                <a16:creationId xmlns:a16="http://schemas.microsoft.com/office/drawing/2014/main" id="{0185217F-EE30-4643-A960-137F0696F55F}"/>
+              </a:ext>
+            </a:extLst>
+          </p:cNvPr>
+          <p:cNvCxnSpPr/>
+          <p:nvPr/>
+        </p:nvCxnSpPr>
+        <p:spPr>
+          <a:xfrm>
+            <a:off x="4242148" y="3427813"/>
+            <a:ext cx="3707704" cy="0"/>
+          </a:xfrm>
+          <a:prstGeom prst="line">
+            <a:avLst/>
+          </a:prstGeom>
+          <a:ln w="12700">
+            <a:solidFill>
+              <a:schemeClr val="bg1"/>
+            </a:solidFill>
+          </a:ln>
+        </p:spPr>
+        <p:style>
+          <a:lnRef idx="1">
+            <a:schemeClr val="accent1"/>
+          </a:lnRef>
+          <a:fillRef idx="0">
+            <a:schemeClr val="accent1"/>
+          </a:fillRef>
+          <a:effectRef idx="0">
+            <a:schemeClr val="accent1"/>
+          </a:effectRef>
+          <a:fontRef idx="minor">
+            <a:schemeClr val="tx1"/>
+          </a:fontRef>
+        </p:style>
+      </p:cxnSp>
+      <p:sp>
+        <p:nvSpPr>
+          <p:cNvPr id="15" name="TextBox 14">
+            <a:extLst>
+              <a:ext uri="{FF2B5EF4-FFF2-40B4-BE49-F238E27FC236}">
+                <a16:creationId xmlns:a16="http://schemas.microsoft.com/office/drawing/2014/main" id="{ACD13FE9-005F-9F44-9595-229D72EE8596}"/>
+              </a:ext>
+            </a:extLst>
+          </p:cNvPr>
+          <p:cNvSpPr txBox="1"/>
+          <p:nvPr/>
+        </p:nvSpPr>
+        <p:spPr>
+          <a:xfrm>
+            <a:off x="3567417" y="3433911"/>
+            <a:ext cx="5057169" cy="523221"/>
+          </a:xfrm>
+          <a:prstGeom prst="rect">
+            <a:avLst/>
+          </a:prstGeom>
+          <a:noFill/>
+        </p:spPr>
+        <p:txBody>
+          <a:bodyPr wrap="square" rtlCol="0" anchor="ctr">
+            <a:spAutoFit/>
+          </a:bodyPr>
+          <a:lstStyle/>
+          <a:p>
+            <a:pPr algn="ctr"/>
+            <a:r>
+              <a:rPr lang="en-US" sz="2800" dirty="0">
+                <a:solidFill>
+                  <a:schemeClr val="bg1">
+                    <a:lumMod val="95000"/>
+                  </a:schemeClr>
+                </a:solidFill>
+                <a:effectLst>
+                  <a:outerShdw blurRad="50800" dist="38100" dir="2700000" algn="tl" rotWithShape="0">
+                    <a:prstClr val="black">
+                      <a:alpha val="40000"/>
+                    </a:prstClr>
+                  </a:outerShdw>
+                </a:effectLst>
+                <a:latin typeface="Copperplate Light" panose="02000604030000020004" pitchFamily="2" charset="77"/>
+              </a:rPr>
+              <a:t>Announcement</a:t>
+            </a:r>
+          </a:p>
+        </p:txBody>
+      </p:sp>
+    </p:spTree>
+    <p:extLst>
+      <p:ext uri="{BB962C8B-B14F-4D97-AF65-F5344CB8AC3E}">
+        <p14:creationId xmlns:p14="http://schemas.microsoft.com/office/powerpoint/2010/main" val="1499006208"/>
+      </p:ext>
+    </p:extLst>
+  </p:cSld>
+  <p:clrMapOvr>
+    <a:masterClrMapping/>
+  </p:clrMapOvr>
+  <p:timing>
+    <p:tnLst>
+      <p:par>
+        <p:cTn id="1" dur="indefinite" restart="never" nodeType="tmRoot">
+          <p:childTnLst>
+            <p:seq concurrent="1" nextAc="seek">
+              <p:cTn id="2" dur="indefinite" nodeType="mainSeq">
+                <p:childTnLst>
+                  <p:par>
+                    <p:cTn id="3" fill="hold">
+                      <p:stCondLst>
+                        <p:cond delay="indefinite"/>
+                        <p:cond evt="onBegin" delay="0">
+                          <p:tn val="2"/>
+                        </p:cond>
+                      </p:stCondLst>
+                      <p:childTnLst>
+                        <p:par>
+                          <p:cTn id="4" fill="hold">
+                            <p:stCondLst>
+                              <p:cond delay="0"/>
+                            </p:stCondLst>
+                            <p:childTnLst>
+                              <p:par>
+                                <p:cTn id="5" presetID="22" presetClass="exit" presetSubtype="4" fill="hold" grpId="1" nodeType="afterEffect">
+                                  <p:stCondLst>
+                                    <p:cond delay="1000"/>
+                                  </p:stCondLst>
+                                  <p:childTnLst>
+                                    <p:animEffect transition="out" filter="wipe(down)">
+                                      <p:cBhvr>
+                                        <p:cTn id="6" dur="500"/>
+                                        <p:tgtEl>
+                                          <p:spTgt spid="15"/>
+                                        </p:tgtEl>
+                                      </p:cBhvr>
+                                    </p:animEffect>
+                                    <p:set>
+                                      <p:cBhvr>
+                                        <p:cTn id="7" dur="1" fill="hold">
+                                          <p:stCondLst>
+                                            <p:cond delay="499"/>
+                                          </p:stCondLst>
+                                        </p:cTn>
+                                        <p:tgtEl>
+                                          <p:spTgt spid="15"/>
+                                        </p:tgtEl>
+                                        <p:attrNameLst>
+                                          <p:attrName>style.visibility</p:attrName>
+                                        </p:attrNameLst>
+                                      </p:cBhvr>
+                                      <p:to>
+                                        <p:strVal val="hidden"/>
+                                      </p:to>
+                                    </p:set>
+                                  </p:childTnLst>
+                                </p:cTn>
+                              </p:par>
+                            </p:childTnLst>
+                          </p:cTn>
+                        </p:par>
+                        <p:par>
+                          <p:cTn id="8" fill="hold">
+                            <p:stCondLst>
+                              <p:cond delay="1500"/>
+                            </p:stCondLst>
+                            <p:childTnLst>
+                              <p:par>
+                                <p:cTn id="9" presetID="16" presetClass="exit" presetSubtype="21" fill="hold" nodeType="afterEffect">
+                                  <p:stCondLst>
+                                    <p:cond delay="0"/>
+                                  </p:stCondLst>
+                                  <p:childTnLst>
+                                    <p:animEffect transition="out" filter="barn(inVertical)">
+                                      <p:cBhvr>
+                                        <p:cTn id="10" dur="500"/>
+                                        <p:tgtEl>
+                                          <p:spTgt spid="14"/>
+                                        </p:tgtEl>
+                                      </p:cBhvr>
+                                    </p:animEffect>
+                                    <p:set>
+                                      <p:cBhvr>
+                                        <p:cTn id="11" dur="1" fill="hold">
+                                          <p:stCondLst>
+                                            <p:cond delay="499"/>
+                                          </p:stCondLst>
+                                        </p:cTn>
+                                        <p:tgtEl>
+                                          <p:spTgt spid="14"/>
+                                        </p:tgtEl>
+                                        <p:attrNameLst>
+                                          <p:attrName>style.visibility</p:attrName>
+                                        </p:attrNameLst>
+                                      </p:cBhvr>
+                                      <p:to>
+                                        <p:strVal val="hidden"/>
+                                      </p:to>
+                                    </p:set>
+                                  </p:childTnLst>
+                                </p:cTn>
+                              </p:par>
+                            </p:childTnLst>
+                          </p:cTn>
+                        </p:par>
+                      </p:childTnLst>
+                    </p:cTn>
+                  </p:par>
+                </p:childTnLst>
+              </p:cTn>
+              <p:prevCondLst>
+                <p:cond evt="onPrev" delay="0">
+                  <p:tgtEl>
+                    <p:sldTgt/>
+                  </p:tgtEl>
+                </p:cond>
+              </p:prevCondLst>
+              <p:nextCondLst>
+                <p:cond evt="onNext" delay="0">
+                  <p:tgtEl>
+                    <p:sldTgt/>
+                  </p:tgtEl>
+                </p:cond>
+              </p:nextCondLst>
+            </p:seq>
+          </p:childTnLst>
+        </p:cTn>
+      </p:par>
+    </p:tnLst>
+    <p:bldLst>
+      <p:bldP spid="15" grpId="1"/>
+    </p:bldLst>
+  </p:timing>
+</p:sld>
+</file>
+
+<file path=ppt/slides/slide7.xml><?xml version="1.0" encoding="utf-8"?>
+<p:sld xmlns:a="http://schemas.openxmlformats.org/drawingml/2006/main" xmlns:r="http://schemas.openxmlformats.org/officeDocument/2006/relationships" xmlns:p="http://schemas.openxmlformats.org/presentationml/2006/main">
+  <p:cSld>
+    <p:spTree>
+      <p:nvGrpSpPr>
+        <p:cNvPr id="1" name=""/>
+        <p:cNvGrpSpPr/>
+        <p:nvPr/>
+      </p:nvGrpSpPr>
+      <p:grpSpPr>
+        <a:xfrm>
+          <a:off x="0" y="0"/>
+          <a:ext cx="0" cy="0"/>
+          <a:chOff x="0" y="0"/>
+          <a:chExt cx="0" cy="0"/>
+        </a:xfrm>
+      </p:grpSpPr>
+      <p:pic>
+        <p:nvPicPr>
+          <p:cNvPr id="10" name="Picture 9">
+            <a:extLst>
+              <a:ext uri="{FF2B5EF4-FFF2-40B4-BE49-F238E27FC236}">
+                <a16:creationId xmlns:a16="http://schemas.microsoft.com/office/drawing/2014/main" id="{3510D210-C82F-7A44-9AE2-2128C3EB58F2}"/>
+              </a:ext>
+            </a:extLst>
+          </p:cNvPr>
+          <p:cNvPicPr>
+            <a:picLocks noChangeAspect="1"/>
+          </p:cNvPicPr>
+          <p:nvPr/>
+        </p:nvPicPr>
+        <p:blipFill rotWithShape="1">
+          <a:blip r:embed="rId2">
+            <a:extLst>
+              <a:ext uri="{28A0092B-C50C-407E-A947-70E740481C1C}">
+                <a14:useLocalDpi xmlns:a14="http://schemas.microsoft.com/office/drawing/2010/main" val="0"/>
+              </a:ext>
+            </a:extLst>
+          </a:blip>
+          <a:srcRect t="16619"/>
+          <a:stretch/>
+        </p:blipFill>
+        <p:spPr>
+          <a:xfrm>
+            <a:off x="-73238" y="2841"/>
+            <a:ext cx="12338477" cy="6944369"/>
+          </a:xfrm>
+          <a:prstGeom prst="rect">
+            <a:avLst/>
+          </a:prstGeom>
+        </p:spPr>
+      </p:pic>
+      <p:sp>
+        <p:nvSpPr>
+          <p:cNvPr id="11" name="Rectangle 10">
+            <a:extLst>
+              <a:ext uri="{FF2B5EF4-FFF2-40B4-BE49-F238E27FC236}">
+                <a16:creationId xmlns:a16="http://schemas.microsoft.com/office/drawing/2014/main" id="{5B5367FB-EAFD-4742-9F50-05904C1BB900}"/>
+              </a:ext>
+            </a:extLst>
+          </p:cNvPr>
+          <p:cNvSpPr/>
+          <p:nvPr/>
+        </p:nvSpPr>
+        <p:spPr>
+          <a:xfrm>
+            <a:off x="-479501" y="6272239"/>
+            <a:ext cx="13292252" cy="552000"/>
+          </a:xfrm>
+          <a:prstGeom prst="rect">
+            <a:avLst/>
+          </a:prstGeom>
+          <a:gradFill flip="none" rotWithShape="1">
+            <a:gsLst>
+              <a:gs pos="0">
+                <a:srgbClr val="BFB097">
+                  <a:alpha val="30000"/>
+                </a:srgbClr>
+              </a:gs>
+              <a:gs pos="49000">
+                <a:srgbClr val="BFB097">
+                  <a:alpha val="80000"/>
+                </a:srgbClr>
+              </a:gs>
+              <a:gs pos="100000">
+                <a:srgbClr val="BFB097">
+                  <a:alpha val="30000"/>
+                </a:srgbClr>
+              </a:gs>
+            </a:gsLst>
+            <a:lin ang="0" scaled="1"/>
+            <a:tileRect/>
+          </a:gradFill>
+          <a:ln>
+            <a:noFill/>
+          </a:ln>
+        </p:spPr>
+        <p:style>
+          <a:lnRef idx="2">
+            <a:schemeClr val="accent1">
+              <a:shade val="50000"/>
+            </a:schemeClr>
+          </a:lnRef>
+          <a:fillRef idx="1">
+            <a:schemeClr val="accent1"/>
+          </a:fillRef>
+          <a:effectRef idx="0">
+            <a:schemeClr val="accent1"/>
+          </a:effectRef>
+          <a:fontRef idx="minor">
+            <a:schemeClr val="lt1"/>
+          </a:fontRef>
+        </p:style>
+        <p:txBody>
+          <a:bodyPr rtlCol="0" anchor="ctr"/>
+          <a:lstStyle/>
+          <a:p>
+            <a:pPr algn="ctr"/>
+            <a:endParaRPr lang="en-US" dirty="0"/>
+          </a:p>
+        </p:txBody>
+      </p:sp>
+      <p:sp>
+        <p:nvSpPr>
+          <p:cNvPr id="13" name="Rectangle 12">
+            <a:extLst>
+              <a:ext uri="{FF2B5EF4-FFF2-40B4-BE49-F238E27FC236}">
+                <a16:creationId xmlns:a16="http://schemas.microsoft.com/office/drawing/2014/main" id="{AB492FFC-07C3-9943-9A25-C78D524C9E4C}"/>
+              </a:ext>
+            </a:extLst>
+          </p:cNvPr>
+          <p:cNvSpPr/>
+          <p:nvPr/>
+        </p:nvSpPr>
+        <p:spPr>
+          <a:xfrm>
+            <a:off x="-190050" y="2841"/>
+            <a:ext cx="12604185" cy="93122"/>
+          </a:xfrm>
+          <a:prstGeom prst="rect">
+            <a:avLst/>
+          </a:prstGeom>
+          <a:gradFill flip="none" rotWithShape="1">
+            <a:gsLst>
+              <a:gs pos="0">
+                <a:srgbClr val="BFB097">
+                  <a:alpha val="47000"/>
+                </a:srgbClr>
+              </a:gs>
+              <a:gs pos="50000">
+                <a:srgbClr val="BFB097"/>
+              </a:gs>
+              <a:gs pos="100000">
+                <a:srgbClr val="BFB097">
+                  <a:alpha val="50000"/>
+                </a:srgbClr>
+              </a:gs>
+            </a:gsLst>
+            <a:lin ang="0" scaled="1"/>
+            <a:tileRect/>
+          </a:gradFill>
+          <a:ln>
+            <a:noFill/>
+          </a:ln>
+        </p:spPr>
+        <p:style>
+          <a:lnRef idx="2">
+            <a:schemeClr val="accent1">
+              <a:shade val="50000"/>
+            </a:schemeClr>
+          </a:lnRef>
+          <a:fillRef idx="1">
+            <a:schemeClr val="accent1"/>
+          </a:fillRef>
+          <a:effectRef idx="0">
+            <a:schemeClr val="accent1"/>
+          </a:effectRef>
+          <a:fontRef idx="minor">
+            <a:schemeClr val="lt1"/>
+          </a:fontRef>
+        </p:style>
+        <p:txBody>
+          <a:bodyPr rtlCol="0" anchor="ctr"/>
+          <a:lstStyle/>
+          <a:p>
+            <a:pPr algn="ctr"/>
+            <a:endParaRPr lang="en-US"/>
+          </a:p>
+        </p:txBody>
+      </p:sp>
+      <p:sp>
+        <p:nvSpPr>
+          <p:cNvPr id="14" name="TextBox 13">
+            <a:extLst>
+              <a:ext uri="{FF2B5EF4-FFF2-40B4-BE49-F238E27FC236}">
+                <a16:creationId xmlns:a16="http://schemas.microsoft.com/office/drawing/2014/main" id="{3BD7BC76-19C3-3749-8E89-A4B844D5376E}"/>
+              </a:ext>
+            </a:extLst>
+          </p:cNvPr>
+          <p:cNvSpPr txBox="1"/>
+          <p:nvPr/>
+        </p:nvSpPr>
+        <p:spPr>
+          <a:xfrm>
+            <a:off x="176571" y="302026"/>
+            <a:ext cx="11838858" cy="5878532"/>
+          </a:xfrm>
+          <a:prstGeom prst="rect">
+            <a:avLst/>
+          </a:prstGeom>
+          <a:noFill/>
+        </p:spPr>
+        <p:txBody>
+          <a:bodyPr wrap="square" rtlCol="0" anchor="t">
+            <a:spAutoFit/>
+          </a:bodyPr>
+          <a:lstStyle/>
+          <a:p>
+            <a:r>
+              <a:rPr lang="en-US" sz="4000" b="1" dirty="0">
+                <a:solidFill>
+                  <a:schemeClr val="bg1">
+                    <a:lumMod val="95000"/>
+                  </a:schemeClr>
+                </a:solidFill>
+                <a:effectLst>
+                  <a:outerShdw blurRad="50800" dist="38100" dir="2700000" algn="tl" rotWithShape="0">
+                    <a:prstClr val="black">
+                      <a:alpha val="40000"/>
+                    </a:prstClr>
+                  </a:outerShdw>
+                </a:effectLst>
+                <a:latin typeface="TH SarabunPSK" panose="020B0500040200020003" pitchFamily="34" charset="-34"/>
+                <a:cs typeface="TH SarabunPSK" panose="020B0500040200020003" pitchFamily="34" charset="-34"/>
+              </a:rPr>
+              <a:t>Psalms 72:15</a:t>
+            </a:r>
+          </a:p>
+          <a:p>
+            <a:r>
+              <a:rPr lang="en-US" sz="3200" b="1" dirty="0">
+                <a:solidFill>
+                  <a:schemeClr val="bg1">
+                    <a:lumMod val="95000"/>
+                  </a:schemeClr>
+                </a:solidFill>
+                <a:effectLst>
+                  <a:outerShdw blurRad="50800" dist="38100" dir="2700000" algn="tl" rotWithShape="0">
+                    <a:prstClr val="black">
+                      <a:alpha val="40000"/>
+                    </a:prstClr>
+                  </a:outerShdw>
+                </a:effectLst>
+                <a:latin typeface="TH SarabunPSK" panose="020B0500040200020003" pitchFamily="34" charset="-34"/>
+                <a:cs typeface="TH SarabunPSK" panose="020B0500040200020003" pitchFamily="34" charset="-34"/>
+              </a:rPr>
+              <a:t>And he shall live, and to him shall be given of the gold of Sheba; prayer also shall be made for him continually; and daily shall he be praised.</a:t>
+            </a:r>
+          </a:p>
+          <a:p>
+            <a:endParaRPr lang="en-US" sz="3200" b="1" dirty="0">
+              <a:solidFill>
+                <a:schemeClr val="bg1">
+                  <a:lumMod val="95000"/>
+                </a:schemeClr>
+              </a:solidFill>
+              <a:effectLst>
+                <a:outerShdw blurRad="50800" dist="38100" dir="2700000" algn="tl" rotWithShape="0">
+                  <a:prstClr val="black">
+                    <a:alpha val="40000"/>
+                  </a:prstClr>
+                </a:outerShdw>
+              </a:effectLst>
+              <a:latin typeface="TH SarabunPSK" panose="020B0500040200020003" pitchFamily="34" charset="-34"/>
+              <a:cs typeface="TH SarabunPSK" panose="020B0500040200020003" pitchFamily="34" charset="-34"/>
+            </a:endParaRPr>
+          </a:p>
+          <a:p>
+            <a:pPr lvl="0"/>
+            <a:r>
+              <a:rPr lang="en-US" sz="4000" b="1" dirty="0">
+                <a:solidFill>
+                  <a:prstClr val="white">
+                    <a:lumMod val="95000"/>
+                  </a:prstClr>
+                </a:solidFill>
+                <a:effectLst>
+                  <a:outerShdw blurRad="50800" dist="38100" dir="2700000" algn="tl" rotWithShape="0">
+                    <a:prstClr val="black">
+                      <a:alpha val="40000"/>
+                    </a:prstClr>
+                  </a:outerShdw>
+                </a:effectLst>
+                <a:latin typeface="TH SarabunPSK" panose="020B0500040200020003" pitchFamily="34" charset="-34"/>
+                <a:cs typeface="TH SarabunPSK" panose="020B0500040200020003" pitchFamily="34" charset="-34"/>
+              </a:rPr>
+              <a:t>Acts 6:4</a:t>
+            </a:r>
+            <a:endParaRPr lang="en-US" sz="3200" b="1" dirty="0">
+              <a:solidFill>
+                <a:schemeClr val="bg1">
+                  <a:lumMod val="95000"/>
+                </a:schemeClr>
+              </a:solidFill>
+              <a:effectLst>
+                <a:outerShdw blurRad="50800" dist="38100" dir="2700000" algn="tl" rotWithShape="0">
+                  <a:prstClr val="black">
+                    <a:alpha val="40000"/>
+                  </a:prstClr>
+                </a:outerShdw>
+              </a:effectLst>
+              <a:latin typeface="TH SarabunPSK" panose="020B0500040200020003" pitchFamily="34" charset="-34"/>
+              <a:cs typeface="TH SarabunPSK" panose="020B0500040200020003" pitchFamily="34" charset="-34"/>
+            </a:endParaRPr>
+          </a:p>
+          <a:p>
+            <a:r>
+              <a:rPr lang="en-US" sz="3200" b="1" dirty="0">
+                <a:solidFill>
+                  <a:schemeClr val="bg1">
+                    <a:lumMod val="95000"/>
+                  </a:schemeClr>
+                </a:solidFill>
+                <a:effectLst>
+                  <a:outerShdw blurRad="50800" dist="38100" dir="2700000" algn="tl" rotWithShape="0">
+                    <a:prstClr val="black">
+                      <a:alpha val="40000"/>
+                    </a:prstClr>
+                  </a:outerShdw>
+                </a:effectLst>
+                <a:latin typeface="TH SarabunPSK" panose="020B0500040200020003" pitchFamily="34" charset="-34"/>
+                <a:cs typeface="TH SarabunPSK" panose="020B0500040200020003" pitchFamily="34" charset="-34"/>
+              </a:rPr>
+              <a:t>But we will give ourselves continually to prayer, and to the ministry of the word.</a:t>
+            </a:r>
+          </a:p>
+          <a:p>
+            <a:endParaRPr lang="en-US" sz="3200" b="1" dirty="0">
+              <a:solidFill>
+                <a:schemeClr val="bg1">
+                  <a:lumMod val="95000"/>
+                </a:schemeClr>
+              </a:solidFill>
+              <a:effectLst>
+                <a:outerShdw blurRad="50800" dist="38100" dir="2700000" algn="tl" rotWithShape="0">
+                  <a:prstClr val="black">
+                    <a:alpha val="40000"/>
+                  </a:prstClr>
+                </a:outerShdw>
+              </a:effectLst>
+              <a:latin typeface="TH SarabunPSK" panose="020B0500040200020003" pitchFamily="34" charset="-34"/>
+              <a:cs typeface="TH SarabunPSK" panose="020B0500040200020003" pitchFamily="34" charset="-34"/>
+            </a:endParaRPr>
+          </a:p>
+          <a:p>
+            <a:r>
+              <a:rPr lang="en-US" sz="4000" b="1" dirty="0">
+                <a:solidFill>
+                  <a:schemeClr val="bg1">
+                    <a:lumMod val="95000"/>
+                  </a:schemeClr>
+                </a:solidFill>
+                <a:effectLst>
+                  <a:outerShdw blurRad="50800" dist="38100" dir="2700000" algn="tl" rotWithShape="0">
+                    <a:prstClr val="black">
+                      <a:alpha val="40000"/>
+                    </a:prstClr>
+                  </a:outerShdw>
+                </a:effectLst>
+                <a:latin typeface="TH SarabunPSK" panose="020B0500040200020003" pitchFamily="34" charset="-34"/>
+                <a:cs typeface="TH SarabunPSK" panose="020B0500040200020003" pitchFamily="34" charset="-34"/>
+              </a:rPr>
+              <a:t>Alma 16:222</a:t>
+            </a:r>
+          </a:p>
+          <a:p>
+            <a:r>
+              <a:rPr lang="en-US" sz="3200" b="1" dirty="0">
+                <a:solidFill>
+                  <a:schemeClr val="bg1">
+                    <a:lumMod val="95000"/>
+                  </a:schemeClr>
+                </a:solidFill>
+                <a:effectLst>
+                  <a:outerShdw blurRad="50800" dist="38100" dir="2700000" algn="tl" rotWithShape="0">
+                    <a:prstClr val="black">
+                      <a:alpha val="40000"/>
+                    </a:prstClr>
+                  </a:outerShdw>
+                </a:effectLst>
+                <a:latin typeface="TH SarabunPSK" panose="020B0500040200020003" pitchFamily="34" charset="-34"/>
+                <a:cs typeface="TH SarabunPSK" panose="020B0500040200020003" pitchFamily="34" charset="-34"/>
+              </a:rPr>
+              <a:t>Yea, and when you do not cry unto the Lord, let your hearts be full, drawn out in prayer unto him continually for your welfare, and also for the welfare of those who are around you.</a:t>
+            </a:r>
+          </a:p>
+        </p:txBody>
+      </p:sp>
+    </p:spTree>
+    <p:extLst>
+      <p:ext uri="{BB962C8B-B14F-4D97-AF65-F5344CB8AC3E}">
+        <p14:creationId xmlns:p14="http://schemas.microsoft.com/office/powerpoint/2010/main" val="2095789897"/>
+      </p:ext>
+    </p:extLst>
+  </p:cSld>
+  <p:clrMapOvr>
+    <a:masterClrMapping/>
+  </p:clrMapOvr>
+</p:sld>
+</file>
+
+<file path=ppt/slides/slide8.xml><?xml version="1.0" encoding="utf-8"?>
+<p:sld xmlns:a="http://schemas.openxmlformats.org/drawingml/2006/main" xmlns:r="http://schemas.openxmlformats.org/officeDocument/2006/relationships" xmlns:p="http://schemas.openxmlformats.org/presentationml/2006/main">
+  <p:cSld>
+    <p:spTree>
+      <p:nvGrpSpPr>
+        <p:cNvPr id="1" name=""/>
+        <p:cNvGrpSpPr/>
+        <p:nvPr/>
+      </p:nvGrpSpPr>
+      <p:grpSpPr>
+        <a:xfrm>
+          <a:off x="0" y="0"/>
+          <a:ext cx="0" cy="0"/>
+          <a:chOff x="0" y="0"/>
+          <a:chExt cx="0" cy="0"/>
+        </a:xfrm>
+      </p:grpSpPr>
+      <p:pic>
+        <p:nvPicPr>
+          <p:cNvPr id="10" name="Picture 9">
+            <a:extLst>
+              <a:ext uri="{FF2B5EF4-FFF2-40B4-BE49-F238E27FC236}">
+                <a16:creationId xmlns:a16="http://schemas.microsoft.com/office/drawing/2014/main" id="{3510D210-C82F-7A44-9AE2-2128C3EB58F2}"/>
+              </a:ext>
+            </a:extLst>
+          </p:cNvPr>
+          <p:cNvPicPr>
+            <a:picLocks noChangeAspect="1"/>
+          </p:cNvPicPr>
+          <p:nvPr/>
+        </p:nvPicPr>
+        <p:blipFill rotWithShape="1">
+          <a:blip r:embed="rId2">
+            <a:extLst>
+              <a:ext uri="{28A0092B-C50C-407E-A947-70E740481C1C}">
+                <a14:useLocalDpi xmlns:a14="http://schemas.microsoft.com/office/drawing/2010/main" val="0"/>
+              </a:ext>
+            </a:extLst>
+          </a:blip>
+          <a:srcRect t="16619"/>
+          <a:stretch/>
+        </p:blipFill>
+        <p:spPr>
+          <a:xfrm>
+            <a:off x="-73238" y="2841"/>
+            <a:ext cx="12338477" cy="6944369"/>
+          </a:xfrm>
+          <a:prstGeom prst="rect">
+            <a:avLst/>
+          </a:prstGeom>
+        </p:spPr>
+      </p:pic>
+      <p:sp>
+        <p:nvSpPr>
+          <p:cNvPr id="11" name="Rectangle 10">
+            <a:extLst>
+              <a:ext uri="{FF2B5EF4-FFF2-40B4-BE49-F238E27FC236}">
+                <a16:creationId xmlns:a16="http://schemas.microsoft.com/office/drawing/2014/main" id="{5B5367FB-EAFD-4742-9F50-05904C1BB900}"/>
+              </a:ext>
+            </a:extLst>
+          </p:cNvPr>
+          <p:cNvSpPr/>
+          <p:nvPr/>
+        </p:nvSpPr>
+        <p:spPr>
+          <a:xfrm>
+            <a:off x="-479501" y="6272239"/>
+            <a:ext cx="13292252" cy="552000"/>
+          </a:xfrm>
+          <a:prstGeom prst="rect">
+            <a:avLst/>
+          </a:prstGeom>
+          <a:gradFill flip="none" rotWithShape="1">
+            <a:gsLst>
+              <a:gs pos="0">
+                <a:srgbClr val="BFB097">
+                  <a:alpha val="30000"/>
+                </a:srgbClr>
+              </a:gs>
+              <a:gs pos="49000">
+                <a:srgbClr val="BFB097">
+                  <a:alpha val="80000"/>
+                </a:srgbClr>
+              </a:gs>
+              <a:gs pos="100000">
+                <a:srgbClr val="BFB097">
+                  <a:alpha val="30000"/>
+                </a:srgbClr>
+              </a:gs>
+            </a:gsLst>
+            <a:lin ang="0" scaled="1"/>
+            <a:tileRect/>
+          </a:gradFill>
+          <a:ln>
+            <a:noFill/>
+          </a:ln>
+        </p:spPr>
+        <p:style>
+          <a:lnRef idx="2">
+            <a:schemeClr val="accent1">
+              <a:shade val="50000"/>
+            </a:schemeClr>
+          </a:lnRef>
+          <a:fillRef idx="1">
+            <a:schemeClr val="accent1"/>
+          </a:fillRef>
+          <a:effectRef idx="0">
+            <a:schemeClr val="accent1"/>
+          </a:effectRef>
+          <a:fontRef idx="minor">
+            <a:schemeClr val="lt1"/>
+          </a:fontRef>
+        </p:style>
+        <p:txBody>
+          <a:bodyPr rtlCol="0" anchor="ctr"/>
+          <a:lstStyle/>
+          <a:p>
+            <a:pPr algn="ctr"/>
+            <a:endParaRPr lang="en-US" dirty="0"/>
+          </a:p>
+        </p:txBody>
+      </p:sp>
+      <p:sp>
+        <p:nvSpPr>
+          <p:cNvPr id="13" name="Rectangle 12">
+            <a:extLst>
+              <a:ext uri="{FF2B5EF4-FFF2-40B4-BE49-F238E27FC236}">
+                <a16:creationId xmlns:a16="http://schemas.microsoft.com/office/drawing/2014/main" id="{AB492FFC-07C3-9943-9A25-C78D524C9E4C}"/>
+              </a:ext>
+            </a:extLst>
+          </p:cNvPr>
+          <p:cNvSpPr/>
+          <p:nvPr/>
+        </p:nvSpPr>
+        <p:spPr>
+          <a:xfrm>
+            <a:off x="-190050" y="2841"/>
+            <a:ext cx="12604185" cy="93122"/>
+          </a:xfrm>
+          <a:prstGeom prst="rect">
+            <a:avLst/>
+          </a:prstGeom>
+          <a:gradFill flip="none" rotWithShape="1">
+            <a:gsLst>
+              <a:gs pos="0">
+                <a:srgbClr val="BFB097">
+                  <a:alpha val="47000"/>
+                </a:srgbClr>
+              </a:gs>
+              <a:gs pos="50000">
+                <a:srgbClr val="BFB097"/>
+              </a:gs>
+              <a:gs pos="100000">
+                <a:srgbClr val="BFB097">
+                  <a:alpha val="50000"/>
+                </a:srgbClr>
+              </a:gs>
+            </a:gsLst>
+            <a:lin ang="0" scaled="1"/>
+            <a:tileRect/>
+          </a:gradFill>
+          <a:ln>
+            <a:noFill/>
+          </a:ln>
+        </p:spPr>
+        <p:style>
+          <a:lnRef idx="2">
+            <a:schemeClr val="accent1">
+              <a:shade val="50000"/>
+            </a:schemeClr>
+          </a:lnRef>
+          <a:fillRef idx="1">
+            <a:schemeClr val="accent1"/>
+          </a:fillRef>
+          <a:effectRef idx="0">
+            <a:schemeClr val="accent1"/>
+          </a:effectRef>
+          <a:fontRef idx="minor">
+            <a:schemeClr val="lt1"/>
+          </a:fontRef>
+        </p:style>
+        <p:txBody>
+          <a:bodyPr rtlCol="0" anchor="ctr"/>
+          <a:lstStyle/>
+          <a:p>
+            <a:pPr algn="ctr"/>
+            <a:endParaRPr lang="en-US"/>
+          </a:p>
+        </p:txBody>
+      </p:sp>
+      <p:sp>
+        <p:nvSpPr>
+          <p:cNvPr id="14" name="TextBox 13">
+            <a:extLst>
+              <a:ext uri="{FF2B5EF4-FFF2-40B4-BE49-F238E27FC236}">
+                <a16:creationId xmlns:a16="http://schemas.microsoft.com/office/drawing/2014/main" id="{3BD7BC76-19C3-3749-8E89-A4B844D5376E}"/>
+              </a:ext>
+            </a:extLst>
+          </p:cNvPr>
+          <p:cNvSpPr txBox="1"/>
+          <p:nvPr/>
+        </p:nvSpPr>
+        <p:spPr>
+          <a:xfrm>
+            <a:off x="176571" y="498796"/>
+            <a:ext cx="11838858" cy="5262979"/>
+          </a:xfrm>
+          <a:prstGeom prst="rect">
+            <a:avLst/>
+          </a:prstGeom>
+          <a:noFill/>
+        </p:spPr>
+        <p:txBody>
+          <a:bodyPr wrap="square" rtlCol="0" anchor="t">
+            <a:spAutoFit/>
+          </a:bodyPr>
+          <a:lstStyle/>
+          <a:p>
+            <a:pPr algn="ctr"/>
+            <a:r>
+              <a:rPr lang="en-US" sz="2400" dirty="0">
+                <a:solidFill>
+                  <a:schemeClr val="bg1"/>
+                </a:solidFill>
+              </a:rPr>
+              <a:t>You have given so much of yourself and still have more to share</a:t>
+            </a:r>
+            <a:br>
+              <a:rPr lang="en-US" sz="4800" dirty="0">
+                <a:solidFill>
+                  <a:schemeClr val="bg1"/>
+                </a:solidFill>
+              </a:rPr>
+            </a:br>
+            <a:r>
+              <a:rPr lang="en-US" sz="2400" dirty="0">
+                <a:solidFill>
+                  <a:schemeClr val="bg1"/>
+                </a:solidFill>
+              </a:rPr>
+              <a:t>When others closes their hearts to love you always seem to care</a:t>
+            </a:r>
+            <a:br>
+              <a:rPr lang="en-US" sz="4800" dirty="0">
+                <a:solidFill>
+                  <a:schemeClr val="bg1"/>
+                </a:solidFill>
+              </a:rPr>
+            </a:br>
+            <a:r>
+              <a:rPr lang="en-US" sz="2400" dirty="0">
+                <a:solidFill>
+                  <a:schemeClr val="bg1"/>
+                </a:solidFill>
+              </a:rPr>
+              <a:t>My mother, my friend how gracious you've shown your love to me</a:t>
+            </a:r>
+            <a:br>
+              <a:rPr lang="en-US" sz="4800" dirty="0">
+                <a:solidFill>
+                  <a:schemeClr val="bg1"/>
+                </a:solidFill>
+              </a:rPr>
+            </a:br>
+            <a:r>
+              <a:rPr lang="en-US" sz="2400" dirty="0">
+                <a:solidFill>
+                  <a:schemeClr val="bg1"/>
+                </a:solidFill>
+              </a:rPr>
+              <a:t>You give of your heart so freely for all of the world to see</a:t>
+            </a:r>
+            <a:endParaRPr lang="en-US" sz="4800" dirty="0">
+              <a:solidFill>
+                <a:schemeClr val="bg1"/>
+              </a:solidFill>
+            </a:endParaRPr>
+          </a:p>
+          <a:p>
+            <a:pPr algn="ctr"/>
+            <a:br>
+              <a:rPr lang="en-US" sz="2000" dirty="0">
+                <a:solidFill>
+                  <a:schemeClr val="bg1"/>
+                </a:solidFill>
+              </a:rPr>
+            </a:br>
+            <a:r>
+              <a:rPr lang="en-US" sz="2400" dirty="0">
+                <a:solidFill>
+                  <a:schemeClr val="bg1"/>
+                </a:solidFill>
+              </a:rPr>
+              <a:t>A beautiful rose and petals from a flower, the root of the family tree</a:t>
+            </a:r>
+            <a:br>
+              <a:rPr lang="en-US" sz="4800" dirty="0">
+                <a:solidFill>
+                  <a:schemeClr val="bg1"/>
+                </a:solidFill>
+              </a:rPr>
+            </a:br>
+            <a:r>
+              <a:rPr lang="en-US" sz="2400" dirty="0">
+                <a:solidFill>
+                  <a:schemeClr val="bg1"/>
+                </a:solidFill>
+              </a:rPr>
+              <a:t>My mother, my friend a gift from God you mean all the world to me</a:t>
+            </a:r>
+            <a:br>
+              <a:rPr lang="en-US" sz="4800" dirty="0">
+                <a:solidFill>
+                  <a:schemeClr val="bg1"/>
+                </a:solidFill>
+              </a:rPr>
+            </a:br>
+            <a:r>
+              <a:rPr lang="en-US" sz="2400" dirty="0">
+                <a:solidFill>
+                  <a:schemeClr val="bg1"/>
+                </a:solidFill>
+              </a:rPr>
+              <a:t>There is no replacement for the unconditional love of a mother</a:t>
+            </a:r>
+            <a:br>
+              <a:rPr lang="en-US" sz="4800" dirty="0">
+                <a:solidFill>
+                  <a:schemeClr val="bg1"/>
+                </a:solidFill>
+              </a:rPr>
+            </a:br>
+            <a:r>
+              <a:rPr lang="en-US" sz="2400" dirty="0">
+                <a:solidFill>
+                  <a:schemeClr val="bg1"/>
+                </a:solidFill>
+              </a:rPr>
+              <a:t>When God formed her he broke the mold for there could never be another</a:t>
+            </a:r>
+            <a:br>
+              <a:rPr lang="en-US" sz="4800" dirty="0">
+                <a:solidFill>
+                  <a:schemeClr val="bg1"/>
+                </a:solidFill>
+              </a:rPr>
+            </a:br>
+            <a:br>
+              <a:rPr lang="en-US" sz="2000" dirty="0">
+                <a:solidFill>
+                  <a:schemeClr val="bg1"/>
+                </a:solidFill>
+              </a:rPr>
+            </a:br>
+            <a:r>
+              <a:rPr lang="en-US" sz="2400" dirty="0">
+                <a:solidFill>
+                  <a:schemeClr val="bg1"/>
+                </a:solidFill>
+              </a:rPr>
+              <a:t>You're just like a tiger in a den that’s protective of her lair </a:t>
+            </a:r>
+            <a:br>
+              <a:rPr lang="en-US" sz="4800" dirty="0">
+                <a:solidFill>
+                  <a:schemeClr val="bg1"/>
+                </a:solidFill>
+              </a:rPr>
+            </a:br>
+            <a:r>
+              <a:rPr lang="en-US" sz="2400" dirty="0">
+                <a:solidFill>
+                  <a:schemeClr val="bg1"/>
+                </a:solidFill>
+              </a:rPr>
+              <a:t>The sharing of your countless love shows others that you care</a:t>
+            </a:r>
+            <a:br>
+              <a:rPr lang="en-US" sz="4800" dirty="0">
+                <a:solidFill>
+                  <a:schemeClr val="bg1"/>
+                </a:solidFill>
+              </a:rPr>
+            </a:br>
+            <a:r>
+              <a:rPr lang="en-US" sz="2400" dirty="0">
+                <a:solidFill>
+                  <a:schemeClr val="bg1"/>
+                </a:solidFill>
+              </a:rPr>
+              <a:t>We sometimes forget that a mother is a blessing from above</a:t>
+            </a:r>
+            <a:br>
+              <a:rPr lang="en-US" sz="4800" dirty="0">
+                <a:solidFill>
+                  <a:schemeClr val="bg1"/>
+                </a:solidFill>
+              </a:rPr>
+            </a:br>
+            <a:r>
+              <a:rPr lang="en-US" sz="2400" dirty="0">
+                <a:solidFill>
+                  <a:schemeClr val="bg1"/>
+                </a:solidFill>
+              </a:rPr>
+              <a:t>My mother, my friend a deep well of never ending love</a:t>
+            </a:r>
+            <a:endParaRPr lang="en-US" sz="3200" b="1" dirty="0">
+              <a:solidFill>
+                <a:schemeClr val="bg1"/>
+              </a:solidFill>
+              <a:effectLst>
+                <a:outerShdw blurRad="50800" dist="38100" dir="2700000" algn="tl" rotWithShape="0">
+                  <a:prstClr val="black">
+                    <a:alpha val="40000"/>
+                  </a:prstClr>
+                </a:outerShdw>
+              </a:effectLst>
+              <a:latin typeface="TH SarabunPSK" panose="020B0500040200020003" pitchFamily="34" charset="-34"/>
+              <a:cs typeface="TH SarabunPSK" panose="020B0500040200020003" pitchFamily="34" charset="-34"/>
+            </a:endParaRPr>
+          </a:p>
+        </p:txBody>
+      </p:sp>
+    </p:spTree>
+    <p:extLst>
+      <p:ext uri="{BB962C8B-B14F-4D97-AF65-F5344CB8AC3E}">
+        <p14:creationId xmlns:p14="http://schemas.microsoft.com/office/powerpoint/2010/main" val="1945492897"/>
+      </p:ext>
+    </p:extLst>
+  </p:cSld>
+  <p:clrMapOvr>
+    <a:masterClrMapping/>
+  </p:clrMapOvr>
+</p:sld>
+</file>
+
+<file path=ppt/slides/slide9.xml><?xml version="1.0" encoding="utf-8"?>
+<p:sld xmlns:a="http://schemas.openxmlformats.org/drawingml/2006/main" xmlns:r="http://schemas.openxmlformats.org/officeDocument/2006/relationships" xmlns:p="http://schemas.openxmlformats.org/presentationml/2006/main">
+  <p:cSld>
+    <p:spTree>
+      <p:nvGrpSpPr>
+        <p:cNvPr id="1" name=""/>
+        <p:cNvGrpSpPr/>
+        <p:nvPr/>
+      </p:nvGrpSpPr>
+      <p:grpSpPr>
+        <a:xfrm>
+          <a:off x="0" y="0"/>
+          <a:ext cx="0" cy="0"/>
+          <a:chOff x="0" y="0"/>
+          <a:chExt cx="0" cy="0"/>
+        </a:xfrm>
+      </p:grpSpPr>
+      <p:sp>
+        <p:nvSpPr>
+          <p:cNvPr id="4" name="Rectangle 3">
+            <a:extLst>
+              <a:ext uri="{FF2B5EF4-FFF2-40B4-BE49-F238E27FC236}">
+                <a16:creationId xmlns:a16="http://schemas.microsoft.com/office/drawing/2014/main" id="{EEE063DD-EC15-4B4A-9487-01BF8525900C}"/>
+              </a:ext>
+            </a:extLst>
+          </p:cNvPr>
+          <p:cNvSpPr/>
+          <p:nvPr/>
+        </p:nvSpPr>
+        <p:spPr>
+          <a:xfrm>
+            <a:off x="0" y="5010762"/>
+            <a:ext cx="12192000" cy="1298078"/>
+          </a:xfrm>
+          <a:prstGeom prst="rect">
+            <a:avLst/>
+          </a:prstGeom>
+          <a:solidFill>
+            <a:srgbClr val="1E231D"/>
+          </a:solidFill>
+          <a:ln>
+            <a:noFill/>
+          </a:ln>
+          <a:effectLst/>
+        </p:spPr>
+        <p:style>
+          <a:lnRef idx="2">
+            <a:schemeClr val="accent1">
+              <a:shade val="50000"/>
+            </a:schemeClr>
+          </a:lnRef>
+          <a:fillRef idx="1">
+            <a:schemeClr val="accent1"/>
+          </a:fillRef>
+          <a:effectRef idx="0">
+            <a:schemeClr val="accent1"/>
+          </a:effectRef>
+          <a:fontRef idx="minor">
+            <a:schemeClr val="lt1"/>
+          </a:fontRef>
+        </p:style>
+        <p:txBody>
+          <a:bodyPr rtlCol="0" anchor="ctr"/>
+          <a:lstStyle/>
+          <a:p>
+            <a:endParaRPr lang="en-US" sz="2000" dirty="0"/>
+          </a:p>
+        </p:txBody>
+      </p:sp>
+      <p:sp>
+        <p:nvSpPr>
+          <p:cNvPr id="7" name="TextBox 6">
+            <a:extLst>
+              <a:ext uri="{FF2B5EF4-FFF2-40B4-BE49-F238E27FC236}">
+                <a16:creationId xmlns:a16="http://schemas.microsoft.com/office/drawing/2014/main" id="{6D930DDE-99BB-474F-B00B-5C29C77767DD}"/>
+              </a:ext>
+            </a:extLst>
+          </p:cNvPr>
+          <p:cNvSpPr txBox="1"/>
+          <p:nvPr/>
+        </p:nvSpPr>
+        <p:spPr>
+          <a:xfrm>
+            <a:off x="635637" y="5126878"/>
+            <a:ext cx="6097672" cy="769441"/>
+          </a:xfrm>
+          <a:prstGeom prst="rect">
+            <a:avLst/>
+          </a:prstGeom>
+          <a:noFill/>
+        </p:spPr>
+        <p:txBody>
           <a:bodyPr wrap="square" rtlCol="0">
             <a:spAutoFit/>
           </a:bodyPr>
           <a:lstStyle/>
           <a:p>
             <a:r>
-              <a:rPr lang="en-US" sz="2000" b="1" dirty="0">
+              <a:rPr lang="en-US" sz="4400" b="1" dirty="0">
                 <a:solidFill>
-                  <a:schemeClr val="bg1"/>
+                  <a:schemeClr val="bg1">
+                    <a:lumMod val="95000"/>
+                  </a:schemeClr>
                 </a:solidFill>
-                <a:latin typeface="Open Sans" panose="020B0606030504020204" pitchFamily="34" charset="0"/>
-                <a:ea typeface="Open Sans" panose="020B0606030504020204" pitchFamily="34" charset="0"/>
-                <a:cs typeface="Open Sans" panose="020B0606030504020204" pitchFamily="34" charset="0"/>
+                <a:latin typeface="TH SarabunPSK" panose="020B0500040200020003" pitchFamily="34" charset="-34"/>
+                <a:ea typeface="Open Sans Light" panose="020B0306030504020204" pitchFamily="34" charset="0"/>
+                <a:cs typeface="TH SarabunPSK" panose="020B0500040200020003" pitchFamily="34" charset="-34"/>
               </a:rPr>
-              <a:t>Invocation</a:t>
-            </a:r>
-          </a:p>
-        </p:txBody>
-      </p:sp>
+              <a:t>Teacher Kevin McMilian</a:t>
+            </a:r>
+          </a:p>
+        </p:txBody>
+      </p:sp>
+      <p:sp>
+        <p:nvSpPr>
+          <p:cNvPr id="8" name="TextBox 7">
+            <a:extLst>
+              <a:ext uri="{FF2B5EF4-FFF2-40B4-BE49-F238E27FC236}">
+                <a16:creationId xmlns:a16="http://schemas.microsoft.com/office/drawing/2014/main" id="{3FE07946-CE88-6040-B682-D30118903E29}"/>
+              </a:ext>
+            </a:extLst>
+          </p:cNvPr>
+          <p:cNvSpPr txBox="1"/>
+          <p:nvPr/>
+        </p:nvSpPr>
+        <p:spPr>
+          <a:xfrm>
+            <a:off x="1191655" y="5693933"/>
+            <a:ext cx="5129976" cy="523220"/>
+          </a:xfrm>
+          <a:prstGeom prst="rect">
+            <a:avLst/>
+          </a:prstGeom>
+          <a:noFill/>
+        </p:spPr>
+        <p:txBody>
+          <a:bodyPr wrap="square" rtlCol="0">
+            <a:spAutoFit/>
+          </a:bodyPr>
+          <a:lstStyle/>
+          <a:p>
+            <a:r>
+              <a:rPr lang="en-US" sz="2800" dirty="0">
+                <a:solidFill>
+                  <a:schemeClr val="bg1">
+                    <a:lumMod val="95000"/>
+                  </a:schemeClr>
+                </a:solidFill>
+                <a:latin typeface="TH SarabunPSK" panose="020B0500040200020003" pitchFamily="34" charset="-34"/>
+                <a:cs typeface="TH SarabunPSK" panose="020B0500040200020003" pitchFamily="34" charset="-34"/>
+              </a:rPr>
+              <a:t>Sermon</a:t>
+            </a:r>
+          </a:p>
+        </p:txBody>
+      </p:sp>
+      <p:pic>
+        <p:nvPicPr>
+          <p:cNvPr id="9" name="Picture 8">
+            <a:extLst>
+              <a:ext uri="{FF2B5EF4-FFF2-40B4-BE49-F238E27FC236}">
+                <a16:creationId xmlns:a16="http://schemas.microsoft.com/office/drawing/2014/main" id="{B13DE8D1-ABFD-1841-92B6-A3DD18750BC1}"/>
+              </a:ext>
+            </a:extLst>
+          </p:cNvPr>
+          <p:cNvPicPr>
+            <a:picLocks noChangeAspect="1"/>
+          </p:cNvPicPr>
+          <p:nvPr/>
+        </p:nvPicPr>
+        <p:blipFill rotWithShape="1">
+          <a:blip r:embed="rId2">
+            <a:extLst>
+              <a:ext uri="{28A0092B-C50C-407E-A947-70E740481C1C}">
+                <a14:useLocalDpi xmlns:a14="http://schemas.microsoft.com/office/drawing/2010/main" val="0"/>
+              </a:ext>
+            </a:extLst>
+          </a:blip>
+          <a:srcRect l="63174" t="73064" r="1" b="8008"/>
+          <a:stretch/>
+        </p:blipFill>
+        <p:spPr>
+          <a:xfrm rot="10800000">
+            <a:off x="7702189" y="5010762"/>
+            <a:ext cx="4489810" cy="1298078"/>
+          </a:xfrm>
+          <a:prstGeom prst="rect">
+            <a:avLst/>
+          </a:prstGeom>
+        </p:spPr>
+      </p:pic>
     </p:spTree>
     <p:extLst>
       <p:ext uri="{BB962C8B-B14F-4D97-AF65-F5344CB8AC3E}">
-        <p14:creationId xmlns:p14="http://schemas.microsoft.com/office/powerpoint/2010/main" val="4132157924"/>
+        <p14:creationId xmlns:p14="http://schemas.microsoft.com/office/powerpoint/2010/main" val="1535299686"/>
       </p:ext>
     </p:extLst>
   </p:cSld>

</xml_diff>